<commit_message>
Final Presentation and WriteUP
</commit_message>
<xml_diff>
--- a/reports/Presentation1.pptx
+++ b/reports/Presentation1.pptx
@@ -15,20 +15,20 @@
     <p:sldId id="258" r:id="rId6"/>
     <p:sldId id="273" r:id="rId7"/>
     <p:sldId id="274" r:id="rId8"/>
-    <p:sldId id="272" r:id="rId9"/>
-    <p:sldId id="284" r:id="rId10"/>
+    <p:sldId id="292" r:id="rId9"/>
+    <p:sldId id="272" r:id="rId10"/>
     <p:sldId id="260" r:id="rId11"/>
-    <p:sldId id="275" r:id="rId12"/>
-    <p:sldId id="291" r:id="rId13"/>
-    <p:sldId id="268" r:id="rId14"/>
-    <p:sldId id="282" r:id="rId15"/>
-    <p:sldId id="276" r:id="rId16"/>
-    <p:sldId id="283" r:id="rId17"/>
-    <p:sldId id="289" r:id="rId18"/>
-    <p:sldId id="279" r:id="rId19"/>
-    <p:sldId id="261" r:id="rId20"/>
-    <p:sldId id="285" r:id="rId21"/>
-    <p:sldId id="286" r:id="rId22"/>
+    <p:sldId id="291" r:id="rId12"/>
+    <p:sldId id="284" r:id="rId13"/>
+    <p:sldId id="275" r:id="rId14"/>
+    <p:sldId id="268" r:id="rId15"/>
+    <p:sldId id="282" r:id="rId16"/>
+    <p:sldId id="289" r:id="rId17"/>
+    <p:sldId id="276" r:id="rId18"/>
+    <p:sldId id="283" r:id="rId19"/>
+    <p:sldId id="279" r:id="rId20"/>
+    <p:sldId id="261" r:id="rId21"/>
+    <p:sldId id="285" r:id="rId22"/>
     <p:sldId id="263" r:id="rId23"/>
   </p:sldIdLst>
   <p:sldSz cx="12192000" cy="6858000"/>
@@ -140,20 +140,20 @@
             <p14:sldId id="258"/>
             <p14:sldId id="273"/>
             <p14:sldId id="274"/>
+            <p14:sldId id="292"/>
             <p14:sldId id="272"/>
+            <p14:sldId id="260"/>
+            <p14:sldId id="291"/>
             <p14:sldId id="284"/>
-            <p14:sldId id="260"/>
             <p14:sldId id="275"/>
-            <p14:sldId id="291"/>
             <p14:sldId id="268"/>
             <p14:sldId id="282"/>
+            <p14:sldId id="289"/>
             <p14:sldId id="276"/>
             <p14:sldId id="283"/>
-            <p14:sldId id="289"/>
             <p14:sldId id="279"/>
             <p14:sldId id="261"/>
             <p14:sldId id="285"/>
-            <p14:sldId id="286"/>
             <p14:sldId id="263"/>
           </p14:sldIdLst>
         </p14:section>
@@ -259,7 +259,7 @@
           <a:p>
             <a:fld id="{D12F0E26-5067-F642-94A3-740695EB8FF5}" type="datetimeFigureOut">
               <a:rPr lang="en-US" smtClean="0"/>
-              <a:t>3/29/19</a:t>
+              <a:t>3/30/19</a:t>
             </a:fld>
             <a:endParaRPr lang="en-US"/>
           </a:p>
@@ -680,7 +680,7 @@
           <a:p>
             <a:fld id="{393312CB-3BCA-9047-8DE9-79636BB0534A}" type="slidenum">
               <a:rPr lang="en-US" smtClean="0"/>
-              <a:t>13</a:t>
+              <a:t>14</a:t>
             </a:fld>
             <a:endParaRPr lang="en-US"/>
           </a:p>
@@ -869,7 +869,7 @@
           <a:p>
             <a:fld id="{65391DDC-B041-0642-912B-52C778FA5BB0}" type="datetimeFigureOut">
               <a:rPr lang="en-US" smtClean="0"/>
-              <a:t>3/29/19</a:t>
+              <a:t>3/30/19</a:t>
             </a:fld>
             <a:endParaRPr lang="en-US"/>
           </a:p>
@@ -1141,7 +1141,7 @@
           <a:p>
             <a:fld id="{65391DDC-B041-0642-912B-52C778FA5BB0}" type="datetimeFigureOut">
               <a:rPr lang="en-US" smtClean="0"/>
-              <a:t>3/29/19</a:t>
+              <a:t>3/30/19</a:t>
             </a:fld>
             <a:endParaRPr lang="en-US"/>
           </a:p>
@@ -1372,7 +1372,7 @@
           <a:p>
             <a:fld id="{65391DDC-B041-0642-912B-52C778FA5BB0}" type="datetimeFigureOut">
               <a:rPr lang="en-US" smtClean="0"/>
-              <a:t>3/29/19</a:t>
+              <a:t>3/30/19</a:t>
             </a:fld>
             <a:endParaRPr lang="en-US"/>
           </a:p>
@@ -1682,7 +1682,7 @@
           <a:p>
             <a:fld id="{65391DDC-B041-0642-912B-52C778FA5BB0}" type="datetimeFigureOut">
               <a:rPr lang="en-US" smtClean="0"/>
-              <a:t>3/29/19</a:t>
+              <a:t>3/30/19</a:t>
             </a:fld>
             <a:endParaRPr lang="en-US"/>
           </a:p>
@@ -2155,7 +2155,7 @@
           <a:p>
             <a:fld id="{65391DDC-B041-0642-912B-52C778FA5BB0}" type="datetimeFigureOut">
               <a:rPr lang="en-US" smtClean="0"/>
-              <a:t>3/29/19</a:t>
+              <a:t>3/30/19</a:t>
             </a:fld>
             <a:endParaRPr lang="en-US"/>
           </a:p>
@@ -2702,7 +2702,7 @@
           <a:p>
             <a:fld id="{65391DDC-B041-0642-912B-52C778FA5BB0}" type="datetimeFigureOut">
               <a:rPr lang="en-US" smtClean="0"/>
-              <a:t>3/29/19</a:t>
+              <a:t>3/30/19</a:t>
             </a:fld>
             <a:endParaRPr lang="en-US"/>
           </a:p>
@@ -3476,7 +3476,7 @@
           <a:p>
             <a:fld id="{65391DDC-B041-0642-912B-52C778FA5BB0}" type="datetimeFigureOut">
               <a:rPr lang="en-US" smtClean="0"/>
-              <a:t>3/29/19</a:t>
+              <a:t>3/30/19</a:t>
             </a:fld>
             <a:endParaRPr lang="en-US"/>
           </a:p>
@@ -3651,7 +3651,7 @@
           <a:p>
             <a:fld id="{65391DDC-B041-0642-912B-52C778FA5BB0}" type="datetimeFigureOut">
               <a:rPr lang="en-US" smtClean="0"/>
-              <a:t>3/29/19</a:t>
+              <a:t>3/30/19</a:t>
             </a:fld>
             <a:endParaRPr lang="en-US"/>
           </a:p>
@@ -3874,7 +3874,7 @@
           <a:p>
             <a:fld id="{65391DDC-B041-0642-912B-52C778FA5BB0}" type="datetimeFigureOut">
               <a:rPr lang="en-US" smtClean="0"/>
-              <a:t>3/29/19</a:t>
+              <a:t>3/30/19</a:t>
             </a:fld>
             <a:endParaRPr lang="en-US"/>
           </a:p>
@@ -4059,7 +4059,7 @@
           <a:p>
             <a:fld id="{65391DDC-B041-0642-912B-52C778FA5BB0}" type="datetimeFigureOut">
               <a:rPr lang="en-US" smtClean="0"/>
-              <a:t>3/29/19</a:t>
+              <a:t>3/30/19</a:t>
             </a:fld>
             <a:endParaRPr lang="en-US"/>
           </a:p>
@@ -4348,7 +4348,7 @@
           <a:p>
             <a:fld id="{65391DDC-B041-0642-912B-52C778FA5BB0}" type="datetimeFigureOut">
               <a:rPr lang="en-US" smtClean="0"/>
-              <a:t>3/29/19</a:t>
+              <a:t>3/30/19</a:t>
             </a:fld>
             <a:endParaRPr lang="en-US"/>
           </a:p>
@@ -4595,7 +4595,7 @@
           <a:p>
             <a:fld id="{65391DDC-B041-0642-912B-52C778FA5BB0}" type="datetimeFigureOut">
               <a:rPr lang="en-US" smtClean="0"/>
-              <a:t>3/29/19</a:t>
+              <a:t>3/30/19</a:t>
             </a:fld>
             <a:endParaRPr lang="en-US"/>
           </a:p>
@@ -4974,7 +4974,7 @@
           <a:p>
             <a:fld id="{65391DDC-B041-0642-912B-52C778FA5BB0}" type="datetimeFigureOut">
               <a:rPr lang="en-US" smtClean="0"/>
-              <a:t>3/29/19</a:t>
+              <a:t>3/30/19</a:t>
             </a:fld>
             <a:endParaRPr lang="en-US"/>
           </a:p>
@@ -5092,7 +5092,7 @@
           <a:p>
             <a:fld id="{65391DDC-B041-0642-912B-52C778FA5BB0}" type="datetimeFigureOut">
               <a:rPr lang="en-US" smtClean="0"/>
-              <a:t>3/29/19</a:t>
+              <a:t>3/30/19</a:t>
             </a:fld>
             <a:endParaRPr lang="en-US"/>
           </a:p>
@@ -5187,7 +5187,7 @@
           <a:p>
             <a:fld id="{65391DDC-B041-0642-912B-52C778FA5BB0}" type="datetimeFigureOut">
               <a:rPr lang="en-US" smtClean="0"/>
-              <a:t>3/29/19</a:t>
+              <a:t>3/30/19</a:t>
             </a:fld>
             <a:endParaRPr lang="en-US"/>
           </a:p>
@@ -5436,7 +5436,7 @@
           <a:p>
             <a:fld id="{65391DDC-B041-0642-912B-52C778FA5BB0}" type="datetimeFigureOut">
               <a:rPr lang="en-US" smtClean="0"/>
-              <a:t>3/29/19</a:t>
+              <a:t>3/30/19</a:t>
             </a:fld>
             <a:endParaRPr lang="en-US"/>
           </a:p>
@@ -5693,7 +5693,7 @@
           <a:p>
             <a:fld id="{65391DDC-B041-0642-912B-52C778FA5BB0}" type="datetimeFigureOut">
               <a:rPr lang="en-US" smtClean="0"/>
-              <a:t>3/29/19</a:t>
+              <a:t>3/30/19</a:t>
             </a:fld>
             <a:endParaRPr lang="en-US"/>
           </a:p>
@@ -5936,7 +5936,7 @@
           <a:p>
             <a:fld id="{65391DDC-B041-0642-912B-52C778FA5BB0}" type="datetimeFigureOut">
               <a:rPr lang="en-US" smtClean="0"/>
-              <a:t>3/29/19</a:t>
+              <a:t>3/30/19</a:t>
             </a:fld>
             <a:endParaRPr lang="en-US"/>
           </a:p>
@@ -6025,7 +6025,7 @@
           <p:cNvPr id="8" name="MSIPCMContentMarking" descr="{&quot;HashCode&quot;:1831732991,&quot;Placement&quot;:&quot;Footer&quot;}">
             <a:extLst>
               <a:ext uri="{FF2B5EF4-FFF2-40B4-BE49-F238E27FC236}">
-                <a16:creationId xmlns:a16="http://schemas.microsoft.com/office/drawing/2014/main" xmlns="" id="{14452350-0B14-4700-8C7F-6552A2CACA03}"/>
+                <a16:creationId xmlns="" xmlns:a16="http://schemas.microsoft.com/office/drawing/2014/main" id="{14452350-0B14-4700-8C7F-6552A2CACA03}"/>
               </a:ext>
             </a:extLst>
           </p:cNvPr>
@@ -6405,7 +6405,7 @@
           <p:cNvPr id="2" name="Title 1">
             <a:extLst>
               <a:ext uri="{FF2B5EF4-FFF2-40B4-BE49-F238E27FC236}">
-                <a16:creationId xmlns:a16="http://schemas.microsoft.com/office/drawing/2014/main" xmlns="" id="{099CA25A-E5BA-A54C-A788-9C6A8959DC58}"/>
+                <a16:creationId xmlns="" xmlns:a16="http://schemas.microsoft.com/office/drawing/2014/main" id="{099CA25A-E5BA-A54C-A788-9C6A8959DC58}"/>
               </a:ext>
             </a:extLst>
           </p:cNvPr>
@@ -6440,7 +6440,7 @@
           <p:cNvPr id="3" name="Subtitle 2">
             <a:extLst>
               <a:ext uri="{FF2B5EF4-FFF2-40B4-BE49-F238E27FC236}">
-                <a16:creationId xmlns:a16="http://schemas.microsoft.com/office/drawing/2014/main" xmlns="" id="{55DB8E11-A9B5-A447-996D-062EAB71E2F0}"/>
+                <a16:creationId xmlns="" xmlns:a16="http://schemas.microsoft.com/office/drawing/2014/main" id="{55DB8E11-A9B5-A447-996D-062EAB71E2F0}"/>
               </a:ext>
             </a:extLst>
           </p:cNvPr>
@@ -6554,7 +6554,7 @@
           <p:cNvPr id="2" name="Title 1">
             <a:extLst>
               <a:ext uri="{FF2B5EF4-FFF2-40B4-BE49-F238E27FC236}">
-                <a16:creationId xmlns:a16="http://schemas.microsoft.com/office/drawing/2014/main" xmlns="" id="{D5DDA148-DFCE-4891-9EAA-B72040FAB27E}"/>
+                <a16:creationId xmlns="" xmlns:a16="http://schemas.microsoft.com/office/drawing/2014/main" id="{D5DDA148-DFCE-4891-9EAA-B72040FAB27E}"/>
               </a:ext>
             </a:extLst>
           </p:cNvPr>
@@ -6623,13 +6623,7 @@
       </p:grpSpPr>
       <p:sp>
         <p:nvSpPr>
-          <p:cNvPr id="2" name="Title 1">
-            <a:extLst>
-              <a:ext uri="{FF2B5EF4-FFF2-40B4-BE49-F238E27FC236}">
-                <a16:creationId xmlns:a16="http://schemas.microsoft.com/office/drawing/2014/main" xmlns="" id="{6110E4C8-860A-40AA-95EF-F9A2C1DD71F9}"/>
-              </a:ext>
-            </a:extLst>
-          </p:cNvPr>
+          <p:cNvPr id="2" name="Title 1"/>
           <p:cNvSpPr>
             <a:spLocks noGrp="1"/>
           </p:cNvSpPr>
@@ -6639,8 +6633,8 @@
         </p:nvSpPr>
         <p:spPr>
           <a:xfrm>
-            <a:off x="685801" y="609601"/>
-            <a:ext cx="10131425" cy="1266334"/>
+            <a:off x="2618510" y="140919"/>
+            <a:ext cx="8610600" cy="1293028"/>
           </a:xfrm>
         </p:spPr>
         <p:txBody>
@@ -6650,23 +6644,15 @@
           <a:lstStyle/>
           <a:p>
             <a:r>
-              <a:rPr lang="en-US" sz="2400" dirty="0"/>
-              <a:t>Highest injuries by weather type</a:t>
-            </a:r>
-            <a:r>
-              <a:rPr lang="en-US" dirty="0"/>
-              <a:t/>
-            </a:r>
-            <a:br>
-              <a:rPr lang="en-US" dirty="0"/>
-            </a:br>
-            <a:endParaRPr lang="en-US" dirty="0"/>
+              <a:rPr lang="en-US" sz="2800" dirty="0"/>
+              <a:t>Example: Data by day</a:t>
+            </a:r>
           </a:p>
         </p:txBody>
       </p:sp>
       <p:pic>
         <p:nvPicPr>
-          <p:cNvPr id="3" name="Content Placeholder 2"/>
+          <p:cNvPr id="4" name="Content Placeholder 3"/>
           <p:cNvPicPr>
             <a:picLocks noGrp="1" noChangeAspect="1"/>
           </p:cNvPicPr>
@@ -6688,15 +6674,15 @@
         </p:blipFill>
         <p:spPr>
           <a:xfrm>
-            <a:off x="1633837" y="1656627"/>
-            <a:ext cx="8723301" cy="4328537"/>
+            <a:off x="342323" y="1066799"/>
+            <a:ext cx="11111346" cy="5555673"/>
           </a:xfrm>
         </p:spPr>
       </p:pic>
     </p:spTree>
     <p:extLst>
       <p:ext uri="{BB962C8B-B14F-4D97-AF65-F5344CB8AC3E}">
-        <p14:creationId xmlns:p14="http://schemas.microsoft.com/office/powerpoint/2010/main" val="2527205018"/>
+        <p14:creationId xmlns:p14="http://schemas.microsoft.com/office/powerpoint/2010/main" val="936695303"/>
       </p:ext>
     </p:extLst>
   </p:cSld>
@@ -6730,39 +6716,15 @@
           <a:chExt cx="0" cy="0"/>
         </a:xfrm>
       </p:grpSpPr>
-      <p:sp>
-        <p:nvSpPr>
-          <p:cNvPr id="2" name="Title 1"/>
-          <p:cNvSpPr>
-            <a:spLocks noGrp="1"/>
-          </p:cNvSpPr>
-          <p:nvPr>
-            <p:ph type="title"/>
-          </p:nvPr>
-        </p:nvSpPr>
-        <p:spPr>
-          <a:xfrm>
-            <a:off x="2618510" y="140919"/>
-            <a:ext cx="8610600" cy="1293028"/>
-          </a:xfrm>
-        </p:spPr>
-        <p:txBody>
-          <a:bodyPr>
-            <a:normAutofit/>
-          </a:bodyPr>
-          <a:lstStyle/>
-          <a:p>
-            <a:r>
-              <a:rPr lang="en-US" sz="2800" dirty="0"/>
-              <a:t>Example: Data by day</a:t>
-            </a:r>
-            <a:endParaRPr lang="en-US" sz="2800" dirty="0"/>
-          </a:p>
-        </p:txBody>
-      </p:sp>
       <p:pic>
         <p:nvPicPr>
-          <p:cNvPr id="4" name="Content Placeholder 3"/>
+          <p:cNvPr id="5" name="Content Placeholder 4">
+            <a:extLst>
+              <a:ext uri="{FF2B5EF4-FFF2-40B4-BE49-F238E27FC236}">
+                <a16:creationId xmlns="" xmlns:a16="http://schemas.microsoft.com/office/drawing/2014/main" id="{39D2510D-176A-45DE-8B7C-A525905EC0BB}"/>
+              </a:ext>
+            </a:extLst>
+          </p:cNvPr>
           <p:cNvPicPr>
             <a:picLocks noGrp="1" noChangeAspect="1"/>
           </p:cNvPicPr>
@@ -6771,28 +6733,22 @@
           </p:nvPr>
         </p:nvPicPr>
         <p:blipFill>
-          <a:blip r:embed="rId2">
-            <a:extLst>
-              <a:ext uri="{28A0092B-C50C-407E-A947-70E740481C1C}">
-                <a14:useLocalDpi xmlns:a14="http://schemas.microsoft.com/office/drawing/2010/main" val="0"/>
-              </a:ext>
-            </a:extLst>
-          </a:blip>
+          <a:blip r:embed="rId2"/>
           <a:stretch>
             <a:fillRect/>
           </a:stretch>
         </p:blipFill>
         <p:spPr>
           <a:xfrm>
-            <a:off x="342323" y="1066799"/>
-            <a:ext cx="11111346" cy="5555673"/>
+            <a:off x="395722" y="484910"/>
+            <a:ext cx="11526979" cy="5763490"/>
           </a:xfrm>
         </p:spPr>
       </p:pic>
     </p:spTree>
     <p:extLst>
       <p:ext uri="{BB962C8B-B14F-4D97-AF65-F5344CB8AC3E}">
-        <p14:creationId xmlns:p14="http://schemas.microsoft.com/office/powerpoint/2010/main" val="936695303"/>
+        <p14:creationId xmlns:p14="http://schemas.microsoft.com/office/powerpoint/2010/main" val="100125960"/>
       </p:ext>
     </p:extLst>
   </p:cSld>
@@ -6831,7 +6787,116 @@
           <p:cNvPr id="2" name="Title 1">
             <a:extLst>
               <a:ext uri="{FF2B5EF4-FFF2-40B4-BE49-F238E27FC236}">
-                <a16:creationId xmlns:a16="http://schemas.microsoft.com/office/drawing/2014/main" xmlns="" id="{BF90F1CA-9661-4FB5-8CA1-1996FE646CDC}"/>
+                <a16:creationId xmlns="" xmlns:a16="http://schemas.microsoft.com/office/drawing/2014/main" id="{6110E4C8-860A-40AA-95EF-F9A2C1DD71F9}"/>
+              </a:ext>
+            </a:extLst>
+          </p:cNvPr>
+          <p:cNvSpPr>
+            <a:spLocks noGrp="1"/>
+          </p:cNvSpPr>
+          <p:nvPr>
+            <p:ph type="title"/>
+          </p:nvPr>
+        </p:nvSpPr>
+        <p:spPr>
+          <a:xfrm>
+            <a:off x="685801" y="609601"/>
+            <a:ext cx="10131425" cy="1266334"/>
+          </a:xfrm>
+        </p:spPr>
+        <p:txBody>
+          <a:bodyPr>
+            <a:normAutofit/>
+          </a:bodyPr>
+          <a:lstStyle/>
+          <a:p>
+            <a:r>
+              <a:rPr lang="en-US" sz="2400" dirty="0"/>
+              <a:t>Highest injuries by weather type</a:t>
+            </a:r>
+            <a:r>
+              <a:rPr lang="en-US" dirty="0"/>
+              <a:t/>
+            </a:r>
+            <a:br>
+              <a:rPr lang="en-US" dirty="0"/>
+            </a:br>
+            <a:endParaRPr lang="en-US" dirty="0"/>
+          </a:p>
+        </p:txBody>
+      </p:sp>
+      <p:pic>
+        <p:nvPicPr>
+          <p:cNvPr id="7" name="Content Placeholder 6"/>
+          <p:cNvPicPr>
+            <a:picLocks noGrp="1" noChangeAspect="1"/>
+          </p:cNvPicPr>
+          <p:nvPr>
+            <p:ph idx="1"/>
+          </p:nvPr>
+        </p:nvPicPr>
+        <p:blipFill>
+          <a:blip r:embed="rId2">
+            <a:extLst>
+              <a:ext uri="{28A0092B-C50C-407E-A947-70E740481C1C}">
+                <a14:useLocalDpi xmlns:a14="http://schemas.microsoft.com/office/drawing/2010/main" val="0"/>
+              </a:ext>
+            </a:extLst>
+          </a:blip>
+          <a:stretch>
+            <a:fillRect/>
+          </a:stretch>
+        </p:blipFill>
+        <p:spPr>
+          <a:xfrm>
+            <a:off x="2056660" y="1387600"/>
+            <a:ext cx="7389705" cy="4540357"/>
+          </a:xfrm>
+        </p:spPr>
+      </p:pic>
+    </p:spTree>
+    <p:extLst>
+      <p:ext uri="{BB962C8B-B14F-4D97-AF65-F5344CB8AC3E}">
+        <p14:creationId xmlns:p14="http://schemas.microsoft.com/office/powerpoint/2010/main" val="2527205018"/>
+      </p:ext>
+    </p:extLst>
+  </p:cSld>
+  <p:clrMapOvr>
+    <a:masterClrMapping/>
+  </p:clrMapOvr>
+  <p:timing>
+    <p:tnLst>
+      <p:par>
+        <p:cTn id="1" dur="indefinite" restart="never" nodeType="tmRoot"/>
+      </p:par>
+    </p:tnLst>
+  </p:timing>
+</p:sld>
+</file>
+
+<file path=ppt/slides/slide14.xml><?xml version="1.0" encoding="utf-8"?>
+<p:sld xmlns:a="http://schemas.openxmlformats.org/drawingml/2006/main" xmlns:r="http://schemas.openxmlformats.org/officeDocument/2006/relationships" xmlns:p="http://schemas.openxmlformats.org/presentationml/2006/main">
+  <p:cSld>
+    <p:spTree>
+      <p:nvGrpSpPr>
+        <p:cNvPr id="1" name=""/>
+        <p:cNvGrpSpPr/>
+        <p:nvPr/>
+      </p:nvGrpSpPr>
+      <p:grpSpPr>
+        <a:xfrm>
+          <a:off x="0" y="0"/>
+          <a:ext cx="0" cy="0"/>
+          <a:chOff x="0" y="0"/>
+          <a:chExt cx="0" cy="0"/>
+        </a:xfrm>
+      </p:grpSpPr>
+      <p:sp>
+        <p:nvSpPr>
+          <p:cNvPr id="2" name="Title 1">
+            <a:extLst>
+              <a:ext uri="{FF2B5EF4-FFF2-40B4-BE49-F238E27FC236}">
+                <a16:creationId xmlns="" xmlns:a16="http://schemas.microsoft.com/office/drawing/2014/main" id="{BF90F1CA-9661-4FB5-8CA1-1996FE646CDC}"/>
               </a:ext>
             </a:extLst>
           </p:cNvPr>
@@ -6874,7 +6939,7 @@
           <p:cNvPr id="16" name="Content Placeholder 15">
             <a:extLst>
               <a:ext uri="{FF2B5EF4-FFF2-40B4-BE49-F238E27FC236}">
-                <a16:creationId xmlns:a16="http://schemas.microsoft.com/office/drawing/2014/main" xmlns="" id="{E35E92D4-D576-45D9-8378-35D2C97B5C8F}"/>
+                <a16:creationId xmlns="" xmlns:a16="http://schemas.microsoft.com/office/drawing/2014/main" id="{E35E92D4-D576-45D9-8378-35D2C97B5C8F}"/>
               </a:ext>
             </a:extLst>
           </p:cNvPr>
@@ -6903,7 +6968,7 @@
           <p:cNvPr id="8" name="Table 7">
             <a:extLst>
               <a:ext uri="{FF2B5EF4-FFF2-40B4-BE49-F238E27FC236}">
-                <a16:creationId xmlns:a16="http://schemas.microsoft.com/office/drawing/2014/main" xmlns="" id="{B8A5C032-3C69-4843-A0C3-DD5DECE64026}"/>
+                <a16:creationId xmlns="" xmlns:a16="http://schemas.microsoft.com/office/drawing/2014/main" id="{B8A5C032-3C69-4843-A0C3-DD5DECE64026}"/>
               </a:ext>
             </a:extLst>
           </p:cNvPr>
@@ -6932,28 +6997,28 @@
                 <a:gridCol w="2529620">
                   <a:extLst>
                     <a:ext uri="{9D8B030D-6E8A-4147-A177-3AD203B41FA5}">
-                      <a16:colId xmlns:a16="http://schemas.microsoft.com/office/drawing/2014/main" xmlns="" val="2670550747"/>
+                      <a16:colId xmlns="" xmlns:a16="http://schemas.microsoft.com/office/drawing/2014/main" val="2670550747"/>
                     </a:ext>
                   </a:extLst>
                 </a:gridCol>
                 <a:gridCol w="2529620">
                   <a:extLst>
                     <a:ext uri="{9D8B030D-6E8A-4147-A177-3AD203B41FA5}">
-                      <a16:colId xmlns:a16="http://schemas.microsoft.com/office/drawing/2014/main" xmlns="" val="1946152109"/>
+                      <a16:colId xmlns="" xmlns:a16="http://schemas.microsoft.com/office/drawing/2014/main" val="1946152109"/>
                     </a:ext>
                   </a:extLst>
                 </a:gridCol>
                 <a:gridCol w="2529620">
                   <a:extLst>
                     <a:ext uri="{9D8B030D-6E8A-4147-A177-3AD203B41FA5}">
-                      <a16:colId xmlns:a16="http://schemas.microsoft.com/office/drawing/2014/main" xmlns="" val="1126911897"/>
+                      <a16:colId xmlns="" xmlns:a16="http://schemas.microsoft.com/office/drawing/2014/main" val="1126911897"/>
                     </a:ext>
                   </a:extLst>
                 </a:gridCol>
                 <a:gridCol w="2529620">
                   <a:extLst>
                     <a:ext uri="{9D8B030D-6E8A-4147-A177-3AD203B41FA5}">
-                      <a16:colId xmlns:a16="http://schemas.microsoft.com/office/drawing/2014/main" xmlns="" val="4138073322"/>
+                      <a16:colId xmlns="" xmlns:a16="http://schemas.microsoft.com/office/drawing/2014/main" val="4138073322"/>
                     </a:ext>
                   </a:extLst>
                 </a:gridCol>
@@ -7014,7 +7079,7 @@
                 </a:tc>
                 <a:extLst>
                   <a:ext uri="{0D108BD9-81ED-4DB2-BD59-A6C34878D82A}">
-                    <a16:rowId xmlns:a16="http://schemas.microsoft.com/office/drawing/2014/main" xmlns="" val="791889607"/>
+                    <a16:rowId xmlns="" xmlns:a16="http://schemas.microsoft.com/office/drawing/2014/main" val="791889607"/>
                   </a:ext>
                 </a:extLst>
               </a:tr>
@@ -7074,7 +7139,7 @@
                 </a:tc>
                 <a:extLst>
                   <a:ext uri="{0D108BD9-81ED-4DB2-BD59-A6C34878D82A}">
-                    <a16:rowId xmlns:a16="http://schemas.microsoft.com/office/drawing/2014/main" xmlns="" val="2004164706"/>
+                    <a16:rowId xmlns="" xmlns:a16="http://schemas.microsoft.com/office/drawing/2014/main" val="2004164706"/>
                   </a:ext>
                 </a:extLst>
               </a:tr>
@@ -7102,7 +7167,7 @@
 </p:sld>
 </file>
 
-<file path=ppt/slides/slide14.xml><?xml version="1.0" encoding="utf-8"?>
+<file path=ppt/slides/slide15.xml><?xml version="1.0" encoding="utf-8"?>
 <p:sld xmlns:a="http://schemas.openxmlformats.org/drawingml/2006/main" xmlns:r="http://schemas.openxmlformats.org/officeDocument/2006/relationships" xmlns:p="http://schemas.openxmlformats.org/presentationml/2006/main">
   <p:cSld>
     <p:spTree>
@@ -7124,7 +7189,7 @@
           <p:cNvPr id="2" name="Title 1">
             <a:extLst>
               <a:ext uri="{FF2B5EF4-FFF2-40B4-BE49-F238E27FC236}">
-                <a16:creationId xmlns:a16="http://schemas.microsoft.com/office/drawing/2014/main" xmlns="" id="{BF90F1CA-9661-4FB5-8CA1-1996FE646CDC}"/>
+                <a16:creationId xmlns="" xmlns:a16="http://schemas.microsoft.com/office/drawing/2014/main" id="{BF90F1CA-9661-4FB5-8CA1-1996FE646CDC}"/>
               </a:ext>
             </a:extLst>
           </p:cNvPr>
@@ -7167,7 +7232,7 @@
           <p:cNvPr id="11" name="Content Placeholder 10">
             <a:extLst>
               <a:ext uri="{FF2B5EF4-FFF2-40B4-BE49-F238E27FC236}">
-                <a16:creationId xmlns:a16="http://schemas.microsoft.com/office/drawing/2014/main" xmlns="" id="{BCB305E1-BBEB-4530-91CA-E0669AE1A1A9}"/>
+                <a16:creationId xmlns="" xmlns:a16="http://schemas.microsoft.com/office/drawing/2014/main" id="{BCB305E1-BBEB-4530-91CA-E0669AE1A1A9}"/>
               </a:ext>
             </a:extLst>
           </p:cNvPr>
@@ -7196,7 +7261,7 @@
           <p:cNvPr id="8" name="Table 7">
             <a:extLst>
               <a:ext uri="{FF2B5EF4-FFF2-40B4-BE49-F238E27FC236}">
-                <a16:creationId xmlns:a16="http://schemas.microsoft.com/office/drawing/2014/main" xmlns="" id="{B8A5C032-3C69-4843-A0C3-DD5DECE64026}"/>
+                <a16:creationId xmlns="" xmlns:a16="http://schemas.microsoft.com/office/drawing/2014/main" id="{B8A5C032-3C69-4843-A0C3-DD5DECE64026}"/>
               </a:ext>
             </a:extLst>
           </p:cNvPr>
@@ -7225,28 +7290,28 @@
                 <a:gridCol w="2529620">
                   <a:extLst>
                     <a:ext uri="{9D8B030D-6E8A-4147-A177-3AD203B41FA5}">
-                      <a16:colId xmlns:a16="http://schemas.microsoft.com/office/drawing/2014/main" xmlns="" val="2670550747"/>
+                      <a16:colId xmlns="" xmlns:a16="http://schemas.microsoft.com/office/drawing/2014/main" val="2670550747"/>
                     </a:ext>
                   </a:extLst>
                 </a:gridCol>
                 <a:gridCol w="2529620">
                   <a:extLst>
                     <a:ext uri="{9D8B030D-6E8A-4147-A177-3AD203B41FA5}">
-                      <a16:colId xmlns:a16="http://schemas.microsoft.com/office/drawing/2014/main" xmlns="" val="1946152109"/>
+                      <a16:colId xmlns="" xmlns:a16="http://schemas.microsoft.com/office/drawing/2014/main" val="1946152109"/>
                     </a:ext>
                   </a:extLst>
                 </a:gridCol>
                 <a:gridCol w="2529620">
                   <a:extLst>
                     <a:ext uri="{9D8B030D-6E8A-4147-A177-3AD203B41FA5}">
-                      <a16:colId xmlns:a16="http://schemas.microsoft.com/office/drawing/2014/main" xmlns="" val="1126911897"/>
+                      <a16:colId xmlns="" xmlns:a16="http://schemas.microsoft.com/office/drawing/2014/main" val="1126911897"/>
                     </a:ext>
                   </a:extLst>
                 </a:gridCol>
                 <a:gridCol w="2529620">
                   <a:extLst>
                     <a:ext uri="{9D8B030D-6E8A-4147-A177-3AD203B41FA5}">
-                      <a16:colId xmlns:a16="http://schemas.microsoft.com/office/drawing/2014/main" xmlns="" val="4138073322"/>
+                      <a16:colId xmlns="" xmlns:a16="http://schemas.microsoft.com/office/drawing/2014/main" val="4138073322"/>
                     </a:ext>
                   </a:extLst>
                 </a:gridCol>
@@ -7307,7 +7372,7 @@
                 </a:tc>
                 <a:extLst>
                   <a:ext uri="{0D108BD9-81ED-4DB2-BD59-A6C34878D82A}">
-                    <a16:rowId xmlns:a16="http://schemas.microsoft.com/office/drawing/2014/main" xmlns="" val="791889607"/>
+                    <a16:rowId xmlns="" xmlns:a16="http://schemas.microsoft.com/office/drawing/2014/main" val="791889607"/>
                   </a:ext>
                 </a:extLst>
               </a:tr>
@@ -7368,7 +7433,7 @@
                 </a:tc>
                 <a:extLst>
                   <a:ext uri="{0D108BD9-81ED-4DB2-BD59-A6C34878D82A}">
-                    <a16:rowId xmlns:a16="http://schemas.microsoft.com/office/drawing/2014/main" xmlns="" val="2004164706"/>
+                    <a16:rowId xmlns="" xmlns:a16="http://schemas.microsoft.com/office/drawing/2014/main" val="2004164706"/>
                   </a:ext>
                 </a:extLst>
               </a:tr>
@@ -7396,619 +7461,7 @@
 </p:sld>
 </file>
 
-<file path=ppt/slides/slide15.xml><?xml version="1.0" encoding="utf-8"?>
-<p:sld xmlns:a="http://schemas.openxmlformats.org/drawingml/2006/main" xmlns:r="http://schemas.openxmlformats.org/officeDocument/2006/relationships" xmlns:p="http://schemas.openxmlformats.org/presentationml/2006/main">
-  <p:cSld>
-    <p:spTree>
-      <p:nvGrpSpPr>
-        <p:cNvPr id="1" name=""/>
-        <p:cNvGrpSpPr/>
-        <p:nvPr/>
-      </p:nvGrpSpPr>
-      <p:grpSpPr>
-        <a:xfrm>
-          <a:off x="0" y="0"/>
-          <a:ext cx="0" cy="0"/>
-          <a:chOff x="0" y="0"/>
-          <a:chExt cx="0" cy="0"/>
-        </a:xfrm>
-      </p:grpSpPr>
-      <p:sp>
-        <p:nvSpPr>
-          <p:cNvPr id="2" name="Title 1">
-            <a:extLst>
-              <a:ext uri="{FF2B5EF4-FFF2-40B4-BE49-F238E27FC236}">
-                <a16:creationId xmlns:a16="http://schemas.microsoft.com/office/drawing/2014/main" xmlns="" id="{8BD559CB-3793-4533-8A7E-67DC3F83F020}"/>
-              </a:ext>
-            </a:extLst>
-          </p:cNvPr>
-          <p:cNvSpPr>
-            <a:spLocks noGrp="1"/>
-          </p:cNvSpPr>
-          <p:nvPr>
-            <p:ph type="title"/>
-          </p:nvPr>
-        </p:nvSpPr>
-        <p:spPr>
-          <a:xfrm>
-            <a:off x="1030287" y="377074"/>
-            <a:ext cx="10131425" cy="1649690"/>
-          </a:xfrm>
-        </p:spPr>
-        <p:txBody>
-          <a:bodyPr>
-            <a:normAutofit/>
-          </a:bodyPr>
-          <a:lstStyle/>
-          <a:p>
-            <a:r>
-              <a:rPr lang="en-US" sz="2400" dirty="0"/>
-              <a:t>Does the </a:t>
-            </a:r>
-            <a:r>
-              <a:rPr lang="en-US" sz="2400" b="1" dirty="0"/>
-              <a:t>minimum temperature </a:t>
-            </a:r>
-            <a:r>
-              <a:rPr lang="en-US" sz="2400" dirty="0"/>
-              <a:t>have a significant effect on the number of Collisions or injuries?</a:t>
-            </a:r>
-            <a:br>
-              <a:rPr lang="en-US" sz="2400" dirty="0"/>
-            </a:br>
-            <a:r>
-              <a:rPr lang="en-US" sz="2400" dirty="0"/>
-              <a:t/>
-            </a:r>
-            <a:br>
-              <a:rPr lang="en-US" sz="2400" dirty="0"/>
-            </a:br>
-            <a:endParaRPr lang="en-US" sz="2400" dirty="0"/>
-          </a:p>
-        </p:txBody>
-      </p:sp>
-      <p:pic>
-        <p:nvPicPr>
-          <p:cNvPr id="4" name="Picture 3">
-            <a:extLst>
-              <a:ext uri="{FF2B5EF4-FFF2-40B4-BE49-F238E27FC236}">
-                <a16:creationId xmlns:a16="http://schemas.microsoft.com/office/drawing/2014/main" xmlns="" id="{86CE72FC-88A5-483D-88D8-ABBF23618905}"/>
-              </a:ext>
-            </a:extLst>
-          </p:cNvPr>
-          <p:cNvPicPr>
-            <a:picLocks noChangeAspect="1"/>
-          </p:cNvPicPr>
-          <p:nvPr/>
-        </p:nvPicPr>
-        <p:blipFill>
-          <a:blip r:embed="rId2"/>
-          <a:stretch>
-            <a:fillRect/>
-          </a:stretch>
-        </p:blipFill>
-        <p:spPr>
-          <a:xfrm>
-            <a:off x="1941920" y="1396738"/>
-            <a:ext cx="8129047" cy="4064524"/>
-          </a:xfrm>
-          <a:prstGeom prst="rect">
-            <a:avLst/>
-          </a:prstGeom>
-        </p:spPr>
-      </p:pic>
-      <p:graphicFrame>
-        <p:nvGraphicFramePr>
-          <p:cNvPr id="5" name="Table 4">
-            <a:extLst>
-              <a:ext uri="{FF2B5EF4-FFF2-40B4-BE49-F238E27FC236}">
-                <a16:creationId xmlns:a16="http://schemas.microsoft.com/office/drawing/2014/main" xmlns="" id="{F990865B-24C7-4CCE-8FB2-D719C4627037}"/>
-              </a:ext>
-            </a:extLst>
-          </p:cNvPr>
-          <p:cNvGraphicFramePr>
-            <a:graphicFrameLocks noGrp="1"/>
-          </p:cNvGraphicFramePr>
-          <p:nvPr>
-            <p:extLst>
-              <p:ext uri="{D42A27DB-BD31-4B8C-83A1-F6EECF244321}">
-                <p14:modId xmlns:p14="http://schemas.microsoft.com/office/powerpoint/2010/main" val="1028107920"/>
-              </p:ext>
-            </p:extLst>
-          </p:nvPr>
-        </p:nvGraphicFramePr>
-        <p:xfrm>
-          <a:off x="1180738" y="5739246"/>
-          <a:ext cx="10131424" cy="741680"/>
-        </p:xfrm>
-        <a:graphic>
-          <a:graphicData uri="http://schemas.openxmlformats.org/drawingml/2006/table">
-            <a:tbl>
-              <a:tblPr firstRow="1" bandRow="1">
-                <a:tableStyleId>{5C22544A-7EE6-4342-B048-85BDC9FD1C3A}</a:tableStyleId>
-              </a:tblPr>
-              <a:tblGrid>
-                <a:gridCol w="2532856">
-                  <a:extLst>
-                    <a:ext uri="{9D8B030D-6E8A-4147-A177-3AD203B41FA5}">
-                      <a16:colId xmlns:a16="http://schemas.microsoft.com/office/drawing/2014/main" xmlns="" val="2670550747"/>
-                    </a:ext>
-                  </a:extLst>
-                </a:gridCol>
-                <a:gridCol w="2532856">
-                  <a:extLst>
-                    <a:ext uri="{9D8B030D-6E8A-4147-A177-3AD203B41FA5}">
-                      <a16:colId xmlns:a16="http://schemas.microsoft.com/office/drawing/2014/main" xmlns="" val="1946152109"/>
-                    </a:ext>
-                  </a:extLst>
-                </a:gridCol>
-                <a:gridCol w="2532856">
-                  <a:extLst>
-                    <a:ext uri="{9D8B030D-6E8A-4147-A177-3AD203B41FA5}">
-                      <a16:colId xmlns:a16="http://schemas.microsoft.com/office/drawing/2014/main" xmlns="" val="1126911897"/>
-                    </a:ext>
-                  </a:extLst>
-                </a:gridCol>
-                <a:gridCol w="2532856">
-                  <a:extLst>
-                    <a:ext uri="{9D8B030D-6E8A-4147-A177-3AD203B41FA5}">
-                      <a16:colId xmlns:a16="http://schemas.microsoft.com/office/drawing/2014/main" xmlns="" val="4138073322"/>
-                    </a:ext>
-                  </a:extLst>
-                </a:gridCol>
-              </a:tblGrid>
-              <a:tr h="370840">
-                <a:tc>
-                  <a:txBody>
-                    <a:bodyPr/>
-                    <a:lstStyle/>
-                    <a:p>
-                      <a:r>
-                        <a:rPr lang="en-US" sz="1400" dirty="0"/>
-                        <a:t>WEATHER FACTOR</a:t>
-                      </a:r>
-                    </a:p>
-                  </a:txBody>
-                  <a:tcPr/>
-                </a:tc>
-                <a:tc>
-                  <a:txBody>
-                    <a:bodyPr/>
-                    <a:lstStyle/>
-                    <a:p>
-                      <a:r>
-                        <a:rPr lang="en-US" sz="1400" dirty="0" smtClean="0"/>
-                        <a:t>R-SQUARED</a:t>
-                      </a:r>
-                      <a:endParaRPr lang="en-US" sz="1400" dirty="0"/>
-                    </a:p>
-                  </a:txBody>
-                  <a:tcPr/>
-                </a:tc>
-                <a:tc>
-                  <a:txBody>
-                    <a:bodyPr/>
-                    <a:lstStyle/>
-                    <a:p>
-                      <a:r>
-                        <a:rPr lang="en-US" sz="1400" dirty="0"/>
-                        <a:t>P-VALUE</a:t>
-                      </a:r>
-                    </a:p>
-                  </a:txBody>
-                  <a:tcPr/>
-                </a:tc>
-                <a:tc>
-                  <a:txBody>
-                    <a:bodyPr/>
-                    <a:lstStyle/>
-                    <a:p>
-                      <a:r>
-                        <a:rPr lang="en-US" sz="1400" dirty="0"/>
-                        <a:t>STANDARD ERROR</a:t>
-                      </a:r>
-                    </a:p>
-                  </a:txBody>
-                  <a:tcPr/>
-                </a:tc>
-                <a:extLst>
-                  <a:ext uri="{0D108BD9-81ED-4DB2-BD59-A6C34878D82A}">
-                    <a16:rowId xmlns:a16="http://schemas.microsoft.com/office/drawing/2014/main" xmlns="" val="791889607"/>
-                  </a:ext>
-                </a:extLst>
-              </a:tr>
-              <a:tr h="370840">
-                <a:tc>
-                  <a:txBody>
-                    <a:bodyPr/>
-                    <a:lstStyle/>
-                    <a:p>
-                      <a:r>
-                        <a:rPr lang="en-US" sz="1400" dirty="0"/>
-                        <a:t>Avg. Min Temperature</a:t>
-                      </a:r>
-                    </a:p>
-                  </a:txBody>
-                  <a:tcPr/>
-                </a:tc>
-                <a:tc>
-                  <a:txBody>
-                    <a:bodyPr/>
-                    <a:lstStyle/>
-                    <a:p>
-                      <a:r>
-                        <a:rPr lang="en-US" sz="1400" dirty="0"/>
-                        <a:t>0.35</a:t>
-                      </a:r>
-                    </a:p>
-                  </a:txBody>
-                  <a:tcPr/>
-                </a:tc>
-                <a:tc>
-                  <a:txBody>
-                    <a:bodyPr/>
-                    <a:lstStyle/>
-                    <a:p>
-                      <a:r>
-                        <a:rPr lang="en-US" sz="1400" dirty="0" smtClean="0"/>
-                        <a:t>8.07e-26</a:t>
-                      </a:r>
-                      <a:endParaRPr lang="en-US" sz="1400" dirty="0"/>
-                    </a:p>
-                  </a:txBody>
-                  <a:tcPr/>
-                </a:tc>
-                <a:tc>
-                  <a:txBody>
-                    <a:bodyPr/>
-                    <a:lstStyle/>
-                    <a:p>
-                      <a:r>
-                        <a:rPr lang="en-US" sz="1400" dirty="0"/>
-                        <a:t>0.56</a:t>
-                      </a:r>
-                    </a:p>
-                  </a:txBody>
-                  <a:tcPr/>
-                </a:tc>
-                <a:extLst>
-                  <a:ext uri="{0D108BD9-81ED-4DB2-BD59-A6C34878D82A}">
-                    <a16:rowId xmlns:a16="http://schemas.microsoft.com/office/drawing/2014/main" xmlns="" val="3687011868"/>
-                  </a:ext>
-                </a:extLst>
-              </a:tr>
-            </a:tbl>
-          </a:graphicData>
-        </a:graphic>
-      </p:graphicFrame>
-    </p:spTree>
-    <p:extLst>
-      <p:ext uri="{BB962C8B-B14F-4D97-AF65-F5344CB8AC3E}">
-        <p14:creationId xmlns:p14="http://schemas.microsoft.com/office/powerpoint/2010/main" val="3764069096"/>
-      </p:ext>
-    </p:extLst>
-  </p:cSld>
-  <p:clrMapOvr>
-    <a:masterClrMapping/>
-  </p:clrMapOvr>
-  <p:timing>
-    <p:tnLst>
-      <p:par>
-        <p:cTn id="1" dur="indefinite" restart="never" nodeType="tmRoot"/>
-      </p:par>
-    </p:tnLst>
-  </p:timing>
-</p:sld>
-</file>
-
 <file path=ppt/slides/slide16.xml><?xml version="1.0" encoding="utf-8"?>
-<p:sld xmlns:a="http://schemas.openxmlformats.org/drawingml/2006/main" xmlns:r="http://schemas.openxmlformats.org/officeDocument/2006/relationships" xmlns:p="http://schemas.openxmlformats.org/presentationml/2006/main">
-  <p:cSld>
-    <p:spTree>
-      <p:nvGrpSpPr>
-        <p:cNvPr id="1" name=""/>
-        <p:cNvGrpSpPr/>
-        <p:nvPr/>
-      </p:nvGrpSpPr>
-      <p:grpSpPr>
-        <a:xfrm>
-          <a:off x="0" y="0"/>
-          <a:ext cx="0" cy="0"/>
-          <a:chOff x="0" y="0"/>
-          <a:chExt cx="0" cy="0"/>
-        </a:xfrm>
-      </p:grpSpPr>
-      <p:sp>
-        <p:nvSpPr>
-          <p:cNvPr id="2" name="Title 1">
-            <a:extLst>
-              <a:ext uri="{FF2B5EF4-FFF2-40B4-BE49-F238E27FC236}">
-                <a16:creationId xmlns:a16="http://schemas.microsoft.com/office/drawing/2014/main" xmlns="" id="{8BD559CB-3793-4533-8A7E-67DC3F83F020}"/>
-              </a:ext>
-            </a:extLst>
-          </p:cNvPr>
-          <p:cNvSpPr>
-            <a:spLocks noGrp="1"/>
-          </p:cNvSpPr>
-          <p:nvPr>
-            <p:ph type="title"/>
-          </p:nvPr>
-        </p:nvSpPr>
-        <p:spPr>
-          <a:xfrm>
-            <a:off x="1030287" y="293909"/>
-            <a:ext cx="10131425" cy="1649690"/>
-          </a:xfrm>
-        </p:spPr>
-        <p:txBody>
-          <a:bodyPr>
-            <a:normAutofit/>
-          </a:bodyPr>
-          <a:lstStyle/>
-          <a:p>
-            <a:r>
-              <a:rPr lang="en-US" sz="2400" dirty="0"/>
-              <a:t>Does the </a:t>
-            </a:r>
-            <a:r>
-              <a:rPr lang="en-US" sz="2400" b="1" dirty="0"/>
-              <a:t>minimum temperature </a:t>
-            </a:r>
-            <a:r>
-              <a:rPr lang="en-US" sz="2400" dirty="0"/>
-              <a:t>have a significant effect on the number of collisions or injuries?</a:t>
-            </a:r>
-            <a:br>
-              <a:rPr lang="en-US" sz="2400" dirty="0"/>
-            </a:br>
-            <a:r>
-              <a:rPr lang="en-US" sz="2400" dirty="0"/>
-              <a:t/>
-            </a:r>
-            <a:br>
-              <a:rPr lang="en-US" sz="2400" dirty="0"/>
-            </a:br>
-            <a:endParaRPr lang="en-US" sz="2400" dirty="0"/>
-          </a:p>
-        </p:txBody>
-      </p:sp>
-      <p:graphicFrame>
-        <p:nvGraphicFramePr>
-          <p:cNvPr id="5" name="Table 4">
-            <a:extLst>
-              <a:ext uri="{FF2B5EF4-FFF2-40B4-BE49-F238E27FC236}">
-                <a16:creationId xmlns:a16="http://schemas.microsoft.com/office/drawing/2014/main" xmlns="" id="{F990865B-24C7-4CCE-8FB2-D719C4627037}"/>
-              </a:ext>
-            </a:extLst>
-          </p:cNvPr>
-          <p:cNvGraphicFramePr>
-            <a:graphicFrameLocks noGrp="1"/>
-          </p:cNvGraphicFramePr>
-          <p:nvPr>
-            <p:extLst>
-              <p:ext uri="{D42A27DB-BD31-4B8C-83A1-F6EECF244321}">
-                <p14:modId xmlns:p14="http://schemas.microsoft.com/office/powerpoint/2010/main" val="1280889232"/>
-              </p:ext>
-            </p:extLst>
-          </p:nvPr>
-        </p:nvGraphicFramePr>
-        <p:xfrm>
-          <a:off x="1180738" y="5739246"/>
-          <a:ext cx="10131424" cy="741680"/>
-        </p:xfrm>
-        <a:graphic>
-          <a:graphicData uri="http://schemas.openxmlformats.org/drawingml/2006/table">
-            <a:tbl>
-              <a:tblPr firstRow="1" bandRow="1">
-                <a:tableStyleId>{5C22544A-7EE6-4342-B048-85BDC9FD1C3A}</a:tableStyleId>
-              </a:tblPr>
-              <a:tblGrid>
-                <a:gridCol w="2532856">
-                  <a:extLst>
-                    <a:ext uri="{9D8B030D-6E8A-4147-A177-3AD203B41FA5}">
-                      <a16:colId xmlns:a16="http://schemas.microsoft.com/office/drawing/2014/main" xmlns="" val="2670550747"/>
-                    </a:ext>
-                  </a:extLst>
-                </a:gridCol>
-                <a:gridCol w="2532856">
-                  <a:extLst>
-                    <a:ext uri="{9D8B030D-6E8A-4147-A177-3AD203B41FA5}">
-                      <a16:colId xmlns:a16="http://schemas.microsoft.com/office/drawing/2014/main" xmlns="" val="1946152109"/>
-                    </a:ext>
-                  </a:extLst>
-                </a:gridCol>
-                <a:gridCol w="2532856">
-                  <a:extLst>
-                    <a:ext uri="{9D8B030D-6E8A-4147-A177-3AD203B41FA5}">
-                      <a16:colId xmlns:a16="http://schemas.microsoft.com/office/drawing/2014/main" xmlns="" val="1126911897"/>
-                    </a:ext>
-                  </a:extLst>
-                </a:gridCol>
-                <a:gridCol w="2532856">
-                  <a:extLst>
-                    <a:ext uri="{9D8B030D-6E8A-4147-A177-3AD203B41FA5}">
-                      <a16:colId xmlns:a16="http://schemas.microsoft.com/office/drawing/2014/main" xmlns="" val="4138073322"/>
-                    </a:ext>
-                  </a:extLst>
-                </a:gridCol>
-              </a:tblGrid>
-              <a:tr h="370840">
-                <a:tc>
-                  <a:txBody>
-                    <a:bodyPr/>
-                    <a:lstStyle/>
-                    <a:p>
-                      <a:r>
-                        <a:rPr lang="en-US" sz="1400" dirty="0"/>
-                        <a:t>WEATHER FACTOR</a:t>
-                      </a:r>
-                    </a:p>
-                  </a:txBody>
-                  <a:tcPr/>
-                </a:tc>
-                <a:tc>
-                  <a:txBody>
-                    <a:bodyPr/>
-                    <a:lstStyle/>
-                    <a:p>
-                      <a:r>
-                        <a:rPr lang="en-US" sz="1400" dirty="0" smtClean="0"/>
-                        <a:t>R-SQUARED</a:t>
-                      </a:r>
-                      <a:endParaRPr lang="en-US" sz="1400" dirty="0"/>
-                    </a:p>
-                  </a:txBody>
-                  <a:tcPr marL="97190" marR="97190"/>
-                </a:tc>
-                <a:tc>
-                  <a:txBody>
-                    <a:bodyPr/>
-                    <a:lstStyle/>
-                    <a:p>
-                      <a:r>
-                        <a:rPr lang="en-US" sz="1400" dirty="0"/>
-                        <a:t>P-VALUE</a:t>
-                      </a:r>
-                    </a:p>
-                  </a:txBody>
-                  <a:tcPr marL="97190" marR="97190"/>
-                </a:tc>
-                <a:tc>
-                  <a:txBody>
-                    <a:bodyPr/>
-                    <a:lstStyle/>
-                    <a:p>
-                      <a:r>
-                        <a:rPr lang="en-US" sz="1400" dirty="0"/>
-                        <a:t>STANDARD ERROR</a:t>
-                      </a:r>
-                    </a:p>
-                  </a:txBody>
-                  <a:tcPr marL="97190" marR="97190"/>
-                </a:tc>
-                <a:extLst>
-                  <a:ext uri="{0D108BD9-81ED-4DB2-BD59-A6C34878D82A}">
-                    <a16:rowId xmlns:a16="http://schemas.microsoft.com/office/drawing/2014/main" xmlns="" val="791889607"/>
-                  </a:ext>
-                </a:extLst>
-              </a:tr>
-              <a:tr h="370840">
-                <a:tc>
-                  <a:txBody>
-                    <a:bodyPr/>
-                    <a:lstStyle/>
-                    <a:p>
-                      <a:r>
-                        <a:rPr lang="en-US" sz="1400" dirty="0"/>
-                        <a:t>Avg. Min Temperature</a:t>
-                      </a:r>
-                    </a:p>
-                  </a:txBody>
-                  <a:tcPr/>
-                </a:tc>
-                <a:tc>
-                  <a:txBody>
-                    <a:bodyPr/>
-                    <a:lstStyle/>
-                    <a:p>
-                      <a:r>
-                        <a:rPr lang="en-US" sz="1400" dirty="0" smtClean="0"/>
-                        <a:t>0.10</a:t>
-                      </a:r>
-                      <a:endParaRPr lang="en-US" sz="1400" dirty="0"/>
-                    </a:p>
-                  </a:txBody>
-                  <a:tcPr marL="97190" marR="97190"/>
-                </a:tc>
-                <a:tc>
-                  <a:txBody>
-                    <a:bodyPr/>
-                    <a:lstStyle/>
-                    <a:p>
-                      <a:r>
-                        <a:rPr lang="en-US" sz="1400" dirty="0" smtClean="0"/>
-                        <a:t>2.09e-7</a:t>
-                      </a:r>
-                      <a:endParaRPr lang="en-US" sz="1400" dirty="0"/>
-                    </a:p>
-                  </a:txBody>
-                  <a:tcPr marL="97190" marR="97190"/>
-                </a:tc>
-                <a:tc>
-                  <a:txBody>
-                    <a:bodyPr/>
-                    <a:lstStyle/>
-                    <a:p>
-                      <a:r>
-                        <a:rPr lang="en-US" sz="1400" dirty="0" smtClean="0"/>
-                        <a:t>1.82</a:t>
-                      </a:r>
-                      <a:endParaRPr lang="en-US" sz="1400" dirty="0"/>
-                    </a:p>
-                  </a:txBody>
-                  <a:tcPr marL="97190" marR="97190"/>
-                </a:tc>
-                <a:extLst>
-                  <a:ext uri="{0D108BD9-81ED-4DB2-BD59-A6C34878D82A}">
-                    <a16:rowId xmlns:a16="http://schemas.microsoft.com/office/drawing/2014/main" xmlns="" val="3687011868"/>
-                  </a:ext>
-                </a:extLst>
-              </a:tr>
-            </a:tbl>
-          </a:graphicData>
-        </a:graphic>
-      </p:graphicFrame>
-      <p:pic>
-        <p:nvPicPr>
-          <p:cNvPr id="9" name="Picture 8"/>
-          <p:cNvPicPr>
-            <a:picLocks noChangeAspect="1"/>
-          </p:cNvPicPr>
-          <p:nvPr/>
-        </p:nvPicPr>
-        <p:blipFill>
-          <a:blip r:embed="rId2">
-            <a:extLst>
-              <a:ext uri="{28A0092B-C50C-407E-A947-70E740481C1C}">
-                <a14:useLocalDpi xmlns:a14="http://schemas.microsoft.com/office/drawing/2010/main" val="0"/>
-              </a:ext>
-            </a:extLst>
-          </a:blip>
-          <a:stretch>
-            <a:fillRect/>
-          </a:stretch>
-        </p:blipFill>
-        <p:spPr>
-          <a:xfrm>
-            <a:off x="2140526" y="1496290"/>
-            <a:ext cx="7910946" cy="3955473"/>
-          </a:xfrm>
-          <a:prstGeom prst="rect">
-            <a:avLst/>
-          </a:prstGeom>
-        </p:spPr>
-      </p:pic>
-    </p:spTree>
-    <p:extLst>
-      <p:ext uri="{BB962C8B-B14F-4D97-AF65-F5344CB8AC3E}">
-        <p14:creationId xmlns:p14="http://schemas.microsoft.com/office/powerpoint/2010/main" val="995087776"/>
-      </p:ext>
-    </p:extLst>
-  </p:cSld>
-  <p:clrMapOvr>
-    <a:masterClrMapping/>
-  </p:clrMapOvr>
-  <p:timing>
-    <p:tnLst>
-      <p:par>
-        <p:cTn id="1" dur="indefinite" restart="never" nodeType="tmRoot"/>
-      </p:par>
-    </p:tnLst>
-  </p:timing>
-</p:sld>
-</file>
-
-<file path=ppt/slides/slide17.xml><?xml version="1.0" encoding="utf-8"?>
 <p:sld xmlns:a="http://schemas.openxmlformats.org/drawingml/2006/main" xmlns:r="http://schemas.openxmlformats.org/officeDocument/2006/relationships" xmlns:p="http://schemas.openxmlformats.org/presentationml/2006/main">
   <p:cSld>
     <p:spTree>
@@ -9241,6 +8694,311 @@
 </p:sld>
 </file>
 
+<file path=ppt/slides/slide17.xml><?xml version="1.0" encoding="utf-8"?>
+<p:sld xmlns:a="http://schemas.openxmlformats.org/drawingml/2006/main" xmlns:r="http://schemas.openxmlformats.org/officeDocument/2006/relationships" xmlns:p="http://schemas.openxmlformats.org/presentationml/2006/main">
+  <p:cSld>
+    <p:spTree>
+      <p:nvGrpSpPr>
+        <p:cNvPr id="1" name=""/>
+        <p:cNvGrpSpPr/>
+        <p:nvPr/>
+      </p:nvGrpSpPr>
+      <p:grpSpPr>
+        <a:xfrm>
+          <a:off x="0" y="0"/>
+          <a:ext cx="0" cy="0"/>
+          <a:chOff x="0" y="0"/>
+          <a:chExt cx="0" cy="0"/>
+        </a:xfrm>
+      </p:grpSpPr>
+      <p:sp>
+        <p:nvSpPr>
+          <p:cNvPr id="2" name="Title 1">
+            <a:extLst>
+              <a:ext uri="{FF2B5EF4-FFF2-40B4-BE49-F238E27FC236}">
+                <a16:creationId xmlns="" xmlns:a16="http://schemas.microsoft.com/office/drawing/2014/main" id="{8BD559CB-3793-4533-8A7E-67DC3F83F020}"/>
+              </a:ext>
+            </a:extLst>
+          </p:cNvPr>
+          <p:cNvSpPr>
+            <a:spLocks noGrp="1"/>
+          </p:cNvSpPr>
+          <p:nvPr>
+            <p:ph type="title"/>
+          </p:nvPr>
+        </p:nvSpPr>
+        <p:spPr>
+          <a:xfrm>
+            <a:off x="1030287" y="377074"/>
+            <a:ext cx="10131425" cy="1649690"/>
+          </a:xfrm>
+        </p:spPr>
+        <p:txBody>
+          <a:bodyPr>
+            <a:normAutofit/>
+          </a:bodyPr>
+          <a:lstStyle/>
+          <a:p>
+            <a:r>
+              <a:rPr lang="en-US" sz="2400" dirty="0"/>
+              <a:t>Does the </a:t>
+            </a:r>
+            <a:r>
+              <a:rPr lang="en-US" sz="2400" b="1" dirty="0"/>
+              <a:t>minimum temperature </a:t>
+            </a:r>
+            <a:r>
+              <a:rPr lang="en-US" sz="2400" dirty="0"/>
+              <a:t>have a significant effect on the number of Collisions or injuries?</a:t>
+            </a:r>
+            <a:br>
+              <a:rPr lang="en-US" sz="2400" dirty="0"/>
+            </a:br>
+            <a:r>
+              <a:rPr lang="en-US" sz="2400" dirty="0"/>
+              <a:t/>
+            </a:r>
+            <a:br>
+              <a:rPr lang="en-US" sz="2400" dirty="0"/>
+            </a:br>
+            <a:endParaRPr lang="en-US" sz="2400" dirty="0"/>
+          </a:p>
+        </p:txBody>
+      </p:sp>
+      <p:pic>
+        <p:nvPicPr>
+          <p:cNvPr id="4" name="Picture 3">
+            <a:extLst>
+              <a:ext uri="{FF2B5EF4-FFF2-40B4-BE49-F238E27FC236}">
+                <a16:creationId xmlns="" xmlns:a16="http://schemas.microsoft.com/office/drawing/2014/main" id="{86CE72FC-88A5-483D-88D8-ABBF23618905}"/>
+              </a:ext>
+            </a:extLst>
+          </p:cNvPr>
+          <p:cNvPicPr>
+            <a:picLocks noChangeAspect="1"/>
+          </p:cNvPicPr>
+          <p:nvPr/>
+        </p:nvPicPr>
+        <p:blipFill>
+          <a:blip r:embed="rId2"/>
+          <a:stretch>
+            <a:fillRect/>
+          </a:stretch>
+        </p:blipFill>
+        <p:spPr>
+          <a:xfrm>
+            <a:off x="1941920" y="1396738"/>
+            <a:ext cx="8129047" cy="4064524"/>
+          </a:xfrm>
+          <a:prstGeom prst="rect">
+            <a:avLst/>
+          </a:prstGeom>
+        </p:spPr>
+      </p:pic>
+      <p:graphicFrame>
+        <p:nvGraphicFramePr>
+          <p:cNvPr id="5" name="Table 4">
+            <a:extLst>
+              <a:ext uri="{FF2B5EF4-FFF2-40B4-BE49-F238E27FC236}">
+                <a16:creationId xmlns="" xmlns:a16="http://schemas.microsoft.com/office/drawing/2014/main" id="{F990865B-24C7-4CCE-8FB2-D719C4627037}"/>
+              </a:ext>
+            </a:extLst>
+          </p:cNvPr>
+          <p:cNvGraphicFramePr>
+            <a:graphicFrameLocks noGrp="1"/>
+          </p:cNvGraphicFramePr>
+          <p:nvPr>
+            <p:extLst>
+              <p:ext uri="{D42A27DB-BD31-4B8C-83A1-F6EECF244321}">
+                <p14:modId xmlns:p14="http://schemas.microsoft.com/office/powerpoint/2010/main" val="1028107920"/>
+              </p:ext>
+            </p:extLst>
+          </p:nvPr>
+        </p:nvGraphicFramePr>
+        <p:xfrm>
+          <a:off x="1180738" y="5739246"/>
+          <a:ext cx="10131424" cy="741680"/>
+        </p:xfrm>
+        <a:graphic>
+          <a:graphicData uri="http://schemas.openxmlformats.org/drawingml/2006/table">
+            <a:tbl>
+              <a:tblPr firstRow="1" bandRow="1">
+                <a:tableStyleId>{5C22544A-7EE6-4342-B048-85BDC9FD1C3A}</a:tableStyleId>
+              </a:tblPr>
+              <a:tblGrid>
+                <a:gridCol w="2532856">
+                  <a:extLst>
+                    <a:ext uri="{9D8B030D-6E8A-4147-A177-3AD203B41FA5}">
+                      <a16:colId xmlns="" xmlns:a16="http://schemas.microsoft.com/office/drawing/2014/main" val="2670550747"/>
+                    </a:ext>
+                  </a:extLst>
+                </a:gridCol>
+                <a:gridCol w="2532856">
+                  <a:extLst>
+                    <a:ext uri="{9D8B030D-6E8A-4147-A177-3AD203B41FA5}">
+                      <a16:colId xmlns="" xmlns:a16="http://schemas.microsoft.com/office/drawing/2014/main" val="1946152109"/>
+                    </a:ext>
+                  </a:extLst>
+                </a:gridCol>
+                <a:gridCol w="2532856">
+                  <a:extLst>
+                    <a:ext uri="{9D8B030D-6E8A-4147-A177-3AD203B41FA5}">
+                      <a16:colId xmlns="" xmlns:a16="http://schemas.microsoft.com/office/drawing/2014/main" val="1126911897"/>
+                    </a:ext>
+                  </a:extLst>
+                </a:gridCol>
+                <a:gridCol w="2532856">
+                  <a:extLst>
+                    <a:ext uri="{9D8B030D-6E8A-4147-A177-3AD203B41FA5}">
+                      <a16:colId xmlns="" xmlns:a16="http://schemas.microsoft.com/office/drawing/2014/main" val="4138073322"/>
+                    </a:ext>
+                  </a:extLst>
+                </a:gridCol>
+              </a:tblGrid>
+              <a:tr h="370840">
+                <a:tc>
+                  <a:txBody>
+                    <a:bodyPr/>
+                    <a:lstStyle/>
+                    <a:p>
+                      <a:r>
+                        <a:rPr lang="en-US" sz="1400" dirty="0"/>
+                        <a:t>WEATHER FACTOR</a:t>
+                      </a:r>
+                    </a:p>
+                  </a:txBody>
+                  <a:tcPr/>
+                </a:tc>
+                <a:tc>
+                  <a:txBody>
+                    <a:bodyPr/>
+                    <a:lstStyle/>
+                    <a:p>
+                      <a:r>
+                        <a:rPr lang="en-US" sz="1400" dirty="0" smtClean="0"/>
+                        <a:t>R-SQUARED</a:t>
+                      </a:r>
+                      <a:endParaRPr lang="en-US" sz="1400" dirty="0"/>
+                    </a:p>
+                  </a:txBody>
+                  <a:tcPr/>
+                </a:tc>
+                <a:tc>
+                  <a:txBody>
+                    <a:bodyPr/>
+                    <a:lstStyle/>
+                    <a:p>
+                      <a:r>
+                        <a:rPr lang="en-US" sz="1400" dirty="0"/>
+                        <a:t>P-VALUE</a:t>
+                      </a:r>
+                    </a:p>
+                  </a:txBody>
+                  <a:tcPr/>
+                </a:tc>
+                <a:tc>
+                  <a:txBody>
+                    <a:bodyPr/>
+                    <a:lstStyle/>
+                    <a:p>
+                      <a:r>
+                        <a:rPr lang="en-US" sz="1400" dirty="0"/>
+                        <a:t>STANDARD ERROR</a:t>
+                      </a:r>
+                    </a:p>
+                  </a:txBody>
+                  <a:tcPr/>
+                </a:tc>
+                <a:extLst>
+                  <a:ext uri="{0D108BD9-81ED-4DB2-BD59-A6C34878D82A}">
+                    <a16:rowId xmlns="" xmlns:a16="http://schemas.microsoft.com/office/drawing/2014/main" val="791889607"/>
+                  </a:ext>
+                </a:extLst>
+              </a:tr>
+              <a:tr h="370840">
+                <a:tc>
+                  <a:txBody>
+                    <a:bodyPr/>
+                    <a:lstStyle/>
+                    <a:p>
+                      <a:r>
+                        <a:rPr lang="en-US" sz="1400" dirty="0"/>
+                        <a:t>Avg. Min Temperature</a:t>
+                      </a:r>
+                    </a:p>
+                  </a:txBody>
+                  <a:tcPr/>
+                </a:tc>
+                <a:tc>
+                  <a:txBody>
+                    <a:bodyPr/>
+                    <a:lstStyle/>
+                    <a:p>
+                      <a:r>
+                        <a:rPr lang="en-US" sz="1400" dirty="0"/>
+                        <a:t>0.35</a:t>
+                      </a:r>
+                    </a:p>
+                  </a:txBody>
+                  <a:tcPr/>
+                </a:tc>
+                <a:tc>
+                  <a:txBody>
+                    <a:bodyPr/>
+                    <a:lstStyle/>
+                    <a:p>
+                      <a:r>
+                        <a:rPr lang="en-US" sz="1400" dirty="0" smtClean="0"/>
+                        <a:t>8.07e-26</a:t>
+                      </a:r>
+                      <a:endParaRPr lang="en-US" sz="1400" dirty="0"/>
+                    </a:p>
+                  </a:txBody>
+                  <a:tcPr/>
+                </a:tc>
+                <a:tc>
+                  <a:txBody>
+                    <a:bodyPr/>
+                    <a:lstStyle/>
+                    <a:p>
+                      <a:r>
+                        <a:rPr lang="en-US" sz="1400" dirty="0"/>
+                        <a:t>0.56</a:t>
+                      </a:r>
+                    </a:p>
+                  </a:txBody>
+                  <a:tcPr/>
+                </a:tc>
+                <a:extLst>
+                  <a:ext uri="{0D108BD9-81ED-4DB2-BD59-A6C34878D82A}">
+                    <a16:rowId xmlns="" xmlns:a16="http://schemas.microsoft.com/office/drawing/2014/main" val="3687011868"/>
+                  </a:ext>
+                </a:extLst>
+              </a:tr>
+            </a:tbl>
+          </a:graphicData>
+        </a:graphic>
+      </p:graphicFrame>
+    </p:spTree>
+    <p:extLst>
+      <p:ext uri="{BB962C8B-B14F-4D97-AF65-F5344CB8AC3E}">
+        <p14:creationId xmlns:p14="http://schemas.microsoft.com/office/powerpoint/2010/main" val="3764069096"/>
+      </p:ext>
+    </p:extLst>
+  </p:cSld>
+  <p:clrMapOvr>
+    <a:masterClrMapping/>
+  </p:clrMapOvr>
+  <p:timing>
+    <p:tnLst>
+      <p:par>
+        <p:cTn id="1" dur="indefinite" restart="never" nodeType="tmRoot"/>
+      </p:par>
+    </p:tnLst>
+  </p:timing>
+</p:sld>
+</file>
+
 <file path=ppt/slides/slide18.xml><?xml version="1.0" encoding="utf-8"?>
 <p:sld xmlns:a="http://schemas.openxmlformats.org/drawingml/2006/main" xmlns:r="http://schemas.openxmlformats.org/officeDocument/2006/relationships" xmlns:p="http://schemas.openxmlformats.org/presentationml/2006/main">
   <p:cSld>
@@ -9263,7 +9021,7 @@
           <p:cNvPr id="2" name="Title 1">
             <a:extLst>
               <a:ext uri="{FF2B5EF4-FFF2-40B4-BE49-F238E27FC236}">
-                <a16:creationId xmlns:a16="http://schemas.microsoft.com/office/drawing/2014/main" xmlns="" id="{BEAC9E21-9D52-409D-A249-CC61323D5992}"/>
+                <a16:creationId xmlns="" xmlns:a16="http://schemas.microsoft.com/office/drawing/2014/main" id="{8BD559CB-3793-4533-8A7E-67DC3F83F020}"/>
               </a:ext>
             </a:extLst>
           </p:cNvPr>
@@ -9276,8 +9034,8 @@
         </p:nvSpPr>
         <p:spPr>
           <a:xfrm>
-            <a:off x="685801" y="609601"/>
-            <a:ext cx="10131425" cy="700726"/>
+            <a:off x="1030287" y="293909"/>
+            <a:ext cx="10131425" cy="1649690"/>
           </a:xfrm>
         </p:spPr>
         <p:txBody>
@@ -9287,45 +9045,251 @@
           <a:lstStyle/>
           <a:p>
             <a:r>
-              <a:rPr lang="en-US" sz="2800" dirty="0"/>
-              <a:t>Total INJURIES vs. Avg Min Temperature</a:t>
-            </a:r>
-          </a:p>
-        </p:txBody>
-      </p:sp>
-      <p:pic>
-        <p:nvPicPr>
-          <p:cNvPr id="6" name="Content Placeholder 5">
+              <a:rPr lang="en-US" sz="2400" dirty="0"/>
+              <a:t>Does the </a:t>
+            </a:r>
+            <a:r>
+              <a:rPr lang="en-US" sz="2400" b="1" dirty="0"/>
+              <a:t>minimum temperature </a:t>
+            </a:r>
+            <a:r>
+              <a:rPr lang="en-US" sz="2400" dirty="0"/>
+              <a:t>have a significant effect on the number of collisions or injuries?</a:t>
+            </a:r>
+            <a:br>
+              <a:rPr lang="en-US" sz="2400" dirty="0"/>
+            </a:br>
+            <a:r>
+              <a:rPr lang="en-US" sz="2400" dirty="0"/>
+              <a:t/>
+            </a:r>
+            <a:br>
+              <a:rPr lang="en-US" sz="2400" dirty="0"/>
+            </a:br>
+            <a:endParaRPr lang="en-US" sz="2400" dirty="0"/>
+          </a:p>
+        </p:txBody>
+      </p:sp>
+      <p:graphicFrame>
+        <p:nvGraphicFramePr>
+          <p:cNvPr id="5" name="Table 4">
             <a:extLst>
               <a:ext uri="{FF2B5EF4-FFF2-40B4-BE49-F238E27FC236}">
-                <a16:creationId xmlns:a16="http://schemas.microsoft.com/office/drawing/2014/main" xmlns="" id="{90B29DA3-DBAD-466D-A2D6-059486FAC0B7}"/>
+                <a16:creationId xmlns="" xmlns:a16="http://schemas.microsoft.com/office/drawing/2014/main" id="{F990865B-24C7-4CCE-8FB2-D719C4627037}"/>
               </a:ext>
             </a:extLst>
           </p:cNvPr>
+          <p:cNvGraphicFramePr>
+            <a:graphicFrameLocks noGrp="1"/>
+          </p:cNvGraphicFramePr>
+          <p:nvPr>
+            <p:extLst>
+              <p:ext uri="{D42A27DB-BD31-4B8C-83A1-F6EECF244321}">
+                <p14:modId xmlns:p14="http://schemas.microsoft.com/office/powerpoint/2010/main" val="1280889232"/>
+              </p:ext>
+            </p:extLst>
+          </p:nvPr>
+        </p:nvGraphicFramePr>
+        <p:xfrm>
+          <a:off x="1180738" y="5739246"/>
+          <a:ext cx="10131424" cy="741680"/>
+        </p:xfrm>
+        <a:graphic>
+          <a:graphicData uri="http://schemas.openxmlformats.org/drawingml/2006/table">
+            <a:tbl>
+              <a:tblPr firstRow="1" bandRow="1">
+                <a:tableStyleId>{5C22544A-7EE6-4342-B048-85BDC9FD1C3A}</a:tableStyleId>
+              </a:tblPr>
+              <a:tblGrid>
+                <a:gridCol w="2532856">
+                  <a:extLst>
+                    <a:ext uri="{9D8B030D-6E8A-4147-A177-3AD203B41FA5}">
+                      <a16:colId xmlns="" xmlns:a16="http://schemas.microsoft.com/office/drawing/2014/main" val="2670550747"/>
+                    </a:ext>
+                  </a:extLst>
+                </a:gridCol>
+                <a:gridCol w="2532856">
+                  <a:extLst>
+                    <a:ext uri="{9D8B030D-6E8A-4147-A177-3AD203B41FA5}">
+                      <a16:colId xmlns="" xmlns:a16="http://schemas.microsoft.com/office/drawing/2014/main" val="1946152109"/>
+                    </a:ext>
+                  </a:extLst>
+                </a:gridCol>
+                <a:gridCol w="2532856">
+                  <a:extLst>
+                    <a:ext uri="{9D8B030D-6E8A-4147-A177-3AD203B41FA5}">
+                      <a16:colId xmlns="" xmlns:a16="http://schemas.microsoft.com/office/drawing/2014/main" val="1126911897"/>
+                    </a:ext>
+                  </a:extLst>
+                </a:gridCol>
+                <a:gridCol w="2532856">
+                  <a:extLst>
+                    <a:ext uri="{9D8B030D-6E8A-4147-A177-3AD203B41FA5}">
+                      <a16:colId xmlns="" xmlns:a16="http://schemas.microsoft.com/office/drawing/2014/main" val="4138073322"/>
+                    </a:ext>
+                  </a:extLst>
+                </a:gridCol>
+              </a:tblGrid>
+              <a:tr h="370840">
+                <a:tc>
+                  <a:txBody>
+                    <a:bodyPr/>
+                    <a:lstStyle/>
+                    <a:p>
+                      <a:r>
+                        <a:rPr lang="en-US" sz="1400" dirty="0"/>
+                        <a:t>WEATHER FACTOR</a:t>
+                      </a:r>
+                    </a:p>
+                  </a:txBody>
+                  <a:tcPr/>
+                </a:tc>
+                <a:tc>
+                  <a:txBody>
+                    <a:bodyPr/>
+                    <a:lstStyle/>
+                    <a:p>
+                      <a:r>
+                        <a:rPr lang="en-US" sz="1400" dirty="0" smtClean="0"/>
+                        <a:t>R-SQUARED</a:t>
+                      </a:r>
+                      <a:endParaRPr lang="en-US" sz="1400" dirty="0"/>
+                    </a:p>
+                  </a:txBody>
+                  <a:tcPr marL="97190" marR="97190"/>
+                </a:tc>
+                <a:tc>
+                  <a:txBody>
+                    <a:bodyPr/>
+                    <a:lstStyle/>
+                    <a:p>
+                      <a:r>
+                        <a:rPr lang="en-US" sz="1400" dirty="0"/>
+                        <a:t>P-VALUE</a:t>
+                      </a:r>
+                    </a:p>
+                  </a:txBody>
+                  <a:tcPr marL="97190" marR="97190"/>
+                </a:tc>
+                <a:tc>
+                  <a:txBody>
+                    <a:bodyPr/>
+                    <a:lstStyle/>
+                    <a:p>
+                      <a:r>
+                        <a:rPr lang="en-US" sz="1400" dirty="0"/>
+                        <a:t>STANDARD ERROR</a:t>
+                      </a:r>
+                    </a:p>
+                  </a:txBody>
+                  <a:tcPr marL="97190" marR="97190"/>
+                </a:tc>
+                <a:extLst>
+                  <a:ext uri="{0D108BD9-81ED-4DB2-BD59-A6C34878D82A}">
+                    <a16:rowId xmlns="" xmlns:a16="http://schemas.microsoft.com/office/drawing/2014/main" val="791889607"/>
+                  </a:ext>
+                </a:extLst>
+              </a:tr>
+              <a:tr h="370840">
+                <a:tc>
+                  <a:txBody>
+                    <a:bodyPr/>
+                    <a:lstStyle/>
+                    <a:p>
+                      <a:r>
+                        <a:rPr lang="en-US" sz="1400" dirty="0"/>
+                        <a:t>Avg. Min Temperature</a:t>
+                      </a:r>
+                    </a:p>
+                  </a:txBody>
+                  <a:tcPr/>
+                </a:tc>
+                <a:tc>
+                  <a:txBody>
+                    <a:bodyPr/>
+                    <a:lstStyle/>
+                    <a:p>
+                      <a:r>
+                        <a:rPr lang="en-US" sz="1400" dirty="0" smtClean="0"/>
+                        <a:t>0.10</a:t>
+                      </a:r>
+                      <a:endParaRPr lang="en-US" sz="1400" dirty="0"/>
+                    </a:p>
+                  </a:txBody>
+                  <a:tcPr marL="97190" marR="97190"/>
+                </a:tc>
+                <a:tc>
+                  <a:txBody>
+                    <a:bodyPr/>
+                    <a:lstStyle/>
+                    <a:p>
+                      <a:r>
+                        <a:rPr lang="en-US" sz="1400" dirty="0" smtClean="0"/>
+                        <a:t>2.09e-7</a:t>
+                      </a:r>
+                      <a:endParaRPr lang="en-US" sz="1400" dirty="0"/>
+                    </a:p>
+                  </a:txBody>
+                  <a:tcPr marL="97190" marR="97190"/>
+                </a:tc>
+                <a:tc>
+                  <a:txBody>
+                    <a:bodyPr/>
+                    <a:lstStyle/>
+                    <a:p>
+                      <a:r>
+                        <a:rPr lang="en-US" sz="1400" dirty="0" smtClean="0"/>
+                        <a:t>1.82</a:t>
+                      </a:r>
+                      <a:endParaRPr lang="en-US" sz="1400" dirty="0"/>
+                    </a:p>
+                  </a:txBody>
+                  <a:tcPr marL="97190" marR="97190"/>
+                </a:tc>
+                <a:extLst>
+                  <a:ext uri="{0D108BD9-81ED-4DB2-BD59-A6C34878D82A}">
+                    <a16:rowId xmlns="" xmlns:a16="http://schemas.microsoft.com/office/drawing/2014/main" val="3687011868"/>
+                  </a:ext>
+                </a:extLst>
+              </a:tr>
+            </a:tbl>
+          </a:graphicData>
+        </a:graphic>
+      </p:graphicFrame>
+      <p:pic>
+        <p:nvPicPr>
+          <p:cNvPr id="9" name="Picture 8"/>
           <p:cNvPicPr>
-            <a:picLocks noGrp="1" noChangeAspect="1"/>
+            <a:picLocks noChangeAspect="1"/>
           </p:cNvPicPr>
-          <p:nvPr>
-            <p:ph sz="half" idx="1"/>
-          </p:nvPr>
+          <p:nvPr/>
         </p:nvPicPr>
         <p:blipFill>
-          <a:blip r:embed="rId2"/>
+          <a:blip r:embed="rId2">
+            <a:extLst>
+              <a:ext uri="{28A0092B-C50C-407E-A947-70E740481C1C}">
+                <a14:useLocalDpi xmlns:a14="http://schemas.microsoft.com/office/drawing/2010/main" val="0"/>
+              </a:ext>
+            </a:extLst>
+          </a:blip>
           <a:stretch>
             <a:fillRect/>
           </a:stretch>
         </p:blipFill>
         <p:spPr>
           <a:xfrm>
-            <a:off x="1046017" y="1570254"/>
-            <a:ext cx="9996055" cy="4998028"/>
-          </a:xfrm>
+            <a:off x="2140526" y="1496290"/>
+            <a:ext cx="7910946" cy="3955473"/>
+          </a:xfrm>
+          <a:prstGeom prst="rect">
+            <a:avLst/>
+          </a:prstGeom>
         </p:spPr>
       </p:pic>
     </p:spTree>
     <p:extLst>
       <p:ext uri="{BB962C8B-B14F-4D97-AF65-F5344CB8AC3E}">
-        <p14:creationId xmlns:p14="http://schemas.microsoft.com/office/powerpoint/2010/main" val="981097307"/>
+        <p14:creationId xmlns:p14="http://schemas.microsoft.com/office/powerpoint/2010/main" val="995087776"/>
       </p:ext>
     </p:extLst>
   </p:cSld>
@@ -9364,7 +9328,7 @@
           <p:cNvPr id="2" name="Title 1">
             <a:extLst>
               <a:ext uri="{FF2B5EF4-FFF2-40B4-BE49-F238E27FC236}">
-                <a16:creationId xmlns:a16="http://schemas.microsoft.com/office/drawing/2014/main" xmlns="" id="{DAF04FBD-68E8-4194-BAD4-0E2591D576AA}"/>
+                <a16:creationId xmlns="" xmlns:a16="http://schemas.microsoft.com/office/drawing/2014/main" id="{BEAC9E21-9D52-409D-A249-CC61323D5992}"/>
               </a:ext>
             </a:extLst>
           </p:cNvPr>
@@ -9377,112 +9341,56 @@
         </p:nvSpPr>
         <p:spPr>
           <a:xfrm>
-            <a:off x="685800" y="221673"/>
-            <a:ext cx="10131425" cy="1456267"/>
-          </a:xfrm>
-        </p:spPr>
-        <p:txBody>
-          <a:bodyPr/>
-          <a:lstStyle/>
-          <a:p>
-            <a:r>
-              <a:rPr lang="en-US" dirty="0" smtClean="0"/>
-              <a:t>Conclusion</a:t>
-            </a:r>
-            <a:endParaRPr lang="en-US" dirty="0"/>
-          </a:p>
-        </p:txBody>
-      </p:sp>
-      <p:sp>
-        <p:nvSpPr>
-          <p:cNvPr id="3" name="Content Placeholder 2">
-            <a:extLst>
-              <a:ext uri="{FF2B5EF4-FFF2-40B4-BE49-F238E27FC236}">
-                <a16:creationId xmlns:a16="http://schemas.microsoft.com/office/drawing/2014/main" xmlns="" id="{8C5F47FE-8208-4CFF-A7C5-DA4BA3139A5A}"/>
-              </a:ext>
-            </a:extLst>
-          </p:cNvPr>
-          <p:cNvSpPr>
-            <a:spLocks noGrp="1"/>
-          </p:cNvSpPr>
-          <p:nvPr>
-            <p:ph idx="1"/>
-          </p:nvPr>
-        </p:nvSpPr>
-        <p:spPr/>
+            <a:off x="685801" y="609601"/>
+            <a:ext cx="10131425" cy="700726"/>
+          </a:xfrm>
+        </p:spPr>
         <p:txBody>
           <a:bodyPr>
             <a:normAutofit/>
           </a:bodyPr>
           <a:lstStyle/>
           <a:p>
-            <a:pPr marL="0" indent="0">
-              <a:buNone/>
-            </a:pPr>
-            <a:r>
-              <a:rPr lang="en-US" sz="3200" dirty="0"/>
-              <a:t> </a:t>
-            </a:r>
             <a:r>
               <a:rPr lang="en-US" sz="2800" dirty="0"/>
-              <a:t>O</a:t>
-            </a:r>
-            <a:r>
-              <a:rPr lang="en-US" sz="2800" dirty="0" smtClean="0"/>
-              <a:t>ur null hypothesis is there is </a:t>
-            </a:r>
-            <a:r>
-              <a:rPr lang="en-US" sz="2800" dirty="0"/>
-              <a:t>no statistical significance between the weather and the amount of collisions, and collision related </a:t>
-            </a:r>
-            <a:r>
-              <a:rPr lang="en-US" sz="2800" dirty="0" smtClean="0"/>
-              <a:t>injuries</a:t>
-            </a:r>
-            <a:r>
-              <a:rPr lang="en-US" sz="2800" dirty="0" smtClean="0"/>
-              <a:t>.</a:t>
-            </a:r>
-          </a:p>
-          <a:p>
-            <a:pPr marL="0" indent="0">
-              <a:buNone/>
-            </a:pPr>
-            <a:endParaRPr lang="en-US" sz="2800" dirty="0" smtClean="0"/>
-          </a:p>
-          <a:p>
-            <a:pPr lvl="1"/>
-            <a:r>
-              <a:rPr lang="en-US" sz="2400" dirty="0" smtClean="0"/>
-              <a:t>We refute the null hypothesis based on temperature </a:t>
-            </a:r>
-          </a:p>
-          <a:p>
-            <a:pPr lvl="1"/>
-            <a:r>
-              <a:rPr lang="en-US" sz="2400" dirty="0" smtClean="0"/>
-              <a:t>We accept the null hypothesis on all other weather conditions</a:t>
-            </a:r>
-            <a:endParaRPr lang="en-US" sz="2400" dirty="0"/>
-          </a:p>
-          <a:p>
-            <a:endParaRPr lang="en-US" sz="3200" dirty="0" smtClean="0"/>
-          </a:p>
-          <a:p>
-            <a:endParaRPr lang="en-US" sz="3200" dirty="0"/>
-          </a:p>
-          <a:p>
-            <a:pPr marL="0" indent="0">
-              <a:buNone/>
-            </a:pPr>
-            <a:endParaRPr lang="en-US" sz="3200" dirty="0"/>
-          </a:p>
-        </p:txBody>
-      </p:sp>
+              <a:t>Total INJURIES vs. Avg Min Temperature</a:t>
+            </a:r>
+          </a:p>
+        </p:txBody>
+      </p:sp>
+      <p:pic>
+        <p:nvPicPr>
+          <p:cNvPr id="6" name="Content Placeholder 5">
+            <a:extLst>
+              <a:ext uri="{FF2B5EF4-FFF2-40B4-BE49-F238E27FC236}">
+                <a16:creationId xmlns="" xmlns:a16="http://schemas.microsoft.com/office/drawing/2014/main" id="{90B29DA3-DBAD-466D-A2D6-059486FAC0B7}"/>
+              </a:ext>
+            </a:extLst>
+          </p:cNvPr>
+          <p:cNvPicPr>
+            <a:picLocks noGrp="1" noChangeAspect="1"/>
+          </p:cNvPicPr>
+          <p:nvPr>
+            <p:ph sz="half" idx="1"/>
+          </p:nvPr>
+        </p:nvPicPr>
+        <p:blipFill>
+          <a:blip r:embed="rId2"/>
+          <a:stretch>
+            <a:fillRect/>
+          </a:stretch>
+        </p:blipFill>
+        <p:spPr>
+          <a:xfrm>
+            <a:off x="1046017" y="1570254"/>
+            <a:ext cx="9996055" cy="4998028"/>
+          </a:xfrm>
+        </p:spPr>
+      </p:pic>
     </p:spTree>
     <p:extLst>
       <p:ext uri="{BB962C8B-B14F-4D97-AF65-F5344CB8AC3E}">
-        <p14:creationId xmlns:p14="http://schemas.microsoft.com/office/powerpoint/2010/main" val="965116165"/>
+        <p14:creationId xmlns:p14="http://schemas.microsoft.com/office/powerpoint/2010/main" val="981097307"/>
       </p:ext>
     </p:extLst>
   </p:cSld>
@@ -9521,7 +9429,7 @@
           <p:cNvPr id="2" name="Title 1">
             <a:extLst>
               <a:ext uri="{FF2B5EF4-FFF2-40B4-BE49-F238E27FC236}">
-                <a16:creationId xmlns:a16="http://schemas.microsoft.com/office/drawing/2014/main" xmlns="" id="{D342906F-996B-4A66-BEB4-13C4A5D51C9A}"/>
+                <a16:creationId xmlns="" xmlns:a16="http://schemas.microsoft.com/office/drawing/2014/main" id="{D342906F-996B-4A66-BEB4-13C4A5D51C9A}"/>
               </a:ext>
             </a:extLst>
           </p:cNvPr>
@@ -9555,7 +9463,7 @@
           <p:cNvPr id="3" name="Content Placeholder 2">
             <a:extLst>
               <a:ext uri="{FF2B5EF4-FFF2-40B4-BE49-F238E27FC236}">
-                <a16:creationId xmlns:a16="http://schemas.microsoft.com/office/drawing/2014/main" xmlns="" id="{B2BD0169-7FD4-44CC-9DCF-20BEC492881F}"/>
+                <a16:creationId xmlns="" xmlns:a16="http://schemas.microsoft.com/office/drawing/2014/main" id="{B2BD0169-7FD4-44CC-9DCF-20BEC492881F}"/>
               </a:ext>
             </a:extLst>
           </p:cNvPr>
@@ -9588,23 +9496,7 @@
             </a:r>
             <a:r>
               <a:rPr lang="en-US" sz="2800" dirty="0" smtClean="0"/>
-              <a:t>eople </a:t>
-            </a:r>
-            <a:r>
-              <a:rPr lang="en-US" sz="2800" dirty="0" smtClean="0"/>
-              <a:t>killed</a:t>
-            </a:r>
-            <a:r>
-              <a:rPr lang="en-US" sz="2800" dirty="0" smtClean="0"/>
-              <a:t>, </a:t>
-            </a:r>
-            <a:r>
-              <a:rPr lang="en-US" sz="2800" dirty="0" smtClean="0"/>
-              <a:t>millions of injuries every </a:t>
-            </a:r>
-            <a:r>
-              <a:rPr lang="en-US" sz="2800" dirty="0" smtClean="0"/>
-              <a:t>year</a:t>
+              <a:t>eople killed, millions of injuries every year</a:t>
             </a:r>
           </a:p>
           <a:p>
@@ -9616,15 +9508,7 @@
           <a:p>
             <a:r>
               <a:rPr lang="en-US" sz="2800" dirty="0" smtClean="0"/>
-              <a:t>Vision </a:t>
-            </a:r>
-            <a:r>
-              <a:rPr lang="en-US" sz="2800" dirty="0" smtClean="0"/>
-              <a:t>Zero </a:t>
-            </a:r>
-            <a:r>
-              <a:rPr lang="en-US" sz="2800" dirty="0" smtClean="0"/>
-              <a:t>Pioneered</a:t>
+              <a:t>Vision Zero Pioneered</a:t>
             </a:r>
           </a:p>
           <a:p>
@@ -9644,11 +9528,7 @@
             </a:r>
             <a:r>
               <a:rPr lang="en-US" sz="2800" dirty="0" smtClean="0"/>
-              <a:t>ublic in </a:t>
-            </a:r>
-            <a:r>
-              <a:rPr lang="en-US" sz="2800" dirty="0" smtClean="0"/>
-              <a:t>2014</a:t>
+              <a:t>ublic in 2014</a:t>
             </a:r>
           </a:p>
           <a:p>
@@ -9660,11 +9540,7 @@
           <a:p>
             <a:r>
               <a:rPr lang="en-US" sz="2800" dirty="0" smtClean="0"/>
-              <a:t>GOAL: Eliminate traffic related accident and </a:t>
-            </a:r>
-            <a:r>
-              <a:rPr lang="en-US" sz="2800" dirty="0" smtClean="0"/>
-              <a:t>deaths</a:t>
+              <a:t>GOAL: Eliminate traffic related accident and deaths</a:t>
             </a:r>
           </a:p>
           <a:p>
@@ -9726,7 +9602,13 @@
       </p:grpSpPr>
       <p:sp>
         <p:nvSpPr>
-          <p:cNvPr id="2" name="Title 1"/>
+          <p:cNvPr id="2" name="Title 1">
+            <a:extLst>
+              <a:ext uri="{FF2B5EF4-FFF2-40B4-BE49-F238E27FC236}">
+                <a16:creationId xmlns="" xmlns:a16="http://schemas.microsoft.com/office/drawing/2014/main" id="{DAF04FBD-68E8-4194-BAD4-0E2591D576AA}"/>
+              </a:ext>
+            </a:extLst>
+          </p:cNvPr>
           <p:cNvSpPr>
             <a:spLocks noGrp="1"/>
           </p:cNvSpPr>
@@ -9734,14 +9616,19 @@
             <p:ph type="title"/>
           </p:nvPr>
         </p:nvSpPr>
-        <p:spPr/>
+        <p:spPr>
+          <a:xfrm>
+            <a:off x="685800" y="221673"/>
+            <a:ext cx="10131425" cy="1456267"/>
+          </a:xfrm>
+        </p:spPr>
         <p:txBody>
           <a:bodyPr/>
           <a:lstStyle/>
           <a:p>
             <a:r>
               <a:rPr lang="en-US" dirty="0" smtClean="0"/>
-              <a:t>Conclusions </a:t>
+              <a:t>Conclusion</a:t>
             </a:r>
             <a:endParaRPr lang="en-US" dirty="0"/>
           </a:p>
@@ -9749,7 +9636,13 @@
       </p:sp>
       <p:sp>
         <p:nvSpPr>
-          <p:cNvPr id="3" name="Content Placeholder 2"/>
+          <p:cNvPr id="3" name="Content Placeholder 2">
+            <a:extLst>
+              <a:ext uri="{FF2B5EF4-FFF2-40B4-BE49-F238E27FC236}">
+                <a16:creationId xmlns="" xmlns:a16="http://schemas.microsoft.com/office/drawing/2014/main" id="{8C5F47FE-8208-4CFF-A7C5-DA4BA3139A5A}"/>
+              </a:ext>
+            </a:extLst>
+          </p:cNvPr>
           <p:cNvSpPr>
             <a:spLocks noGrp="1"/>
           </p:cNvSpPr>
@@ -9757,15 +9650,10 @@
             <p:ph idx="1"/>
           </p:nvPr>
         </p:nvSpPr>
-        <p:spPr>
-          <a:xfrm>
-            <a:off x="606669" y="2280140"/>
-            <a:ext cx="10289688" cy="3909646"/>
-          </a:xfrm>
-        </p:spPr>
+        <p:spPr/>
         <p:txBody>
           <a:bodyPr>
-            <a:normAutofit lnSpcReduction="10000"/>
+            <a:normAutofit/>
           </a:bodyPr>
           <a:lstStyle/>
           <a:p>
@@ -9773,78 +9661,65 @@
               <a:buNone/>
             </a:pPr>
             <a:r>
-              <a:rPr lang="en-US" sz="2800" b="1" dirty="0" smtClean="0"/>
-              <a:t>Expected Results</a:t>
-            </a:r>
-            <a:endParaRPr lang="en-US" sz="2800" b="1" dirty="0"/>
+              <a:rPr lang="en-US" sz="3200" dirty="0"/>
+              <a:t> </a:t>
+            </a:r>
+            <a:r>
+              <a:rPr lang="en-US" sz="2800" dirty="0"/>
+              <a:t>O</a:t>
+            </a:r>
+            <a:r>
+              <a:rPr lang="en-US" sz="2800" dirty="0" smtClean="0"/>
+              <a:t>ur null hypothesis is there is </a:t>
+            </a:r>
+            <a:r>
+              <a:rPr lang="en-US" sz="2800" dirty="0"/>
+              <a:t>no statistical significance between the weather and the amount of collisions, and collision related </a:t>
+            </a:r>
+            <a:r>
+              <a:rPr lang="en-US" sz="2800" dirty="0" smtClean="0"/>
+              <a:t>injuries.</a:t>
+            </a:r>
+          </a:p>
+          <a:p>
+            <a:pPr marL="0" indent="0">
+              <a:buNone/>
+            </a:pPr>
+            <a:endParaRPr lang="en-US" sz="2800" dirty="0" smtClean="0"/>
           </a:p>
           <a:p>
             <a:pPr lvl="1"/>
             <a:r>
               <a:rPr lang="en-US" sz="2400" dirty="0" smtClean="0"/>
-              <a:t>We expected higher traffic collisions in the winter because of adverse weather conditions, but the opposite was proven</a:t>
-            </a:r>
-          </a:p>
-          <a:p>
-            <a:pPr marL="457200" lvl="1" indent="0">
+              <a:t>We refute the null hypothesis based on temperature </a:t>
+            </a:r>
+          </a:p>
+          <a:p>
+            <a:pPr lvl="1"/>
+            <a:r>
+              <a:rPr lang="en-US" sz="2400" dirty="0" smtClean="0"/>
+              <a:t>We accept the null hypothesis on all other weather conditions</a:t>
+            </a:r>
+            <a:endParaRPr lang="en-US" sz="2400" dirty="0"/>
+          </a:p>
+          <a:p>
+            <a:endParaRPr lang="en-US" sz="3200" dirty="0" smtClean="0"/>
+          </a:p>
+          <a:p>
+            <a:endParaRPr lang="en-US" sz="3200" dirty="0"/>
+          </a:p>
+          <a:p>
+            <a:pPr marL="0" indent="0">
               <a:buNone/>
             </a:pPr>
-            <a:endParaRPr lang="en-US" sz="2800" dirty="0"/>
-          </a:p>
-          <a:p>
-            <a:pPr marL="0" indent="0">
-              <a:buNone/>
-            </a:pPr>
-            <a:r>
-              <a:rPr lang="en-US" sz="2800" b="1" dirty="0" smtClean="0"/>
-              <a:t>Inferences</a:t>
-            </a:r>
-          </a:p>
-          <a:p>
-            <a:pPr lvl="1"/>
-            <a:r>
-              <a:rPr lang="en-US" sz="2400" dirty="0" smtClean="0"/>
-              <a:t>The higher amounts of traffic collisions in the summer may be due to other factors such as: </a:t>
-            </a:r>
-          </a:p>
-          <a:p>
-            <a:pPr lvl="2"/>
-            <a:r>
-              <a:rPr lang="en-US" sz="2400" dirty="0" smtClean="0"/>
-              <a:t>Increase in total miles driven per person </a:t>
-            </a:r>
-          </a:p>
-          <a:p>
-            <a:pPr lvl="2"/>
-            <a:r>
-              <a:rPr lang="en-US" sz="2400" dirty="0" smtClean="0"/>
-              <a:t>Increased tourism  </a:t>
-            </a:r>
-          </a:p>
-          <a:p>
-            <a:pPr lvl="2"/>
-            <a:r>
-              <a:rPr lang="en-US" sz="2400" dirty="0" smtClean="0"/>
-              <a:t>Increase in night time activities </a:t>
-            </a:r>
-          </a:p>
-          <a:p>
-            <a:pPr lvl="2"/>
-            <a:endParaRPr lang="en-US" dirty="0" smtClean="0"/>
-          </a:p>
-          <a:p>
-            <a:pPr lvl="1"/>
-            <a:endParaRPr lang="en-US" dirty="0"/>
-          </a:p>
-          <a:p>
-            <a:endParaRPr lang="en-US" dirty="0"/>
+            <a:endParaRPr lang="en-US" sz="3200" dirty="0"/>
           </a:p>
         </p:txBody>
       </p:sp>
     </p:spTree>
     <p:extLst>
       <p:ext uri="{BB962C8B-B14F-4D97-AF65-F5344CB8AC3E}">
-        <p14:creationId xmlns:p14="http://schemas.microsoft.com/office/powerpoint/2010/main" val="173081127"/>
+        <p14:creationId xmlns:p14="http://schemas.microsoft.com/office/powerpoint/2010/main" val="965116165"/>
       </p:ext>
     </p:extLst>
   </p:cSld>
@@ -9888,19 +9763,14 @@
             <p:ph type="title"/>
           </p:nvPr>
         </p:nvSpPr>
-        <p:spPr>
-          <a:xfrm>
-            <a:off x="3061854" y="570409"/>
-            <a:ext cx="8610600" cy="1293028"/>
-          </a:xfrm>
-        </p:spPr>
+        <p:spPr/>
         <p:txBody>
           <a:bodyPr/>
           <a:lstStyle/>
           <a:p>
             <a:r>
               <a:rPr lang="en-US" dirty="0" smtClean="0"/>
-              <a:t>Challenges/difficulties</a:t>
+              <a:t>Conclusions </a:t>
             </a:r>
             <a:endParaRPr lang="en-US" dirty="0"/>
           </a:p>
@@ -9913,55 +9783,97 @@
             <a:spLocks noGrp="1"/>
           </p:cNvSpPr>
           <p:nvPr>
-            <p:ph sz="half" idx="1"/>
-          </p:nvPr>
-        </p:nvSpPr>
-        <p:spPr>
-          <a:xfrm>
-            <a:off x="838201" y="2587010"/>
-            <a:ext cx="10023763" cy="2774699"/>
+            <p:ph idx="1"/>
+          </p:nvPr>
+        </p:nvSpPr>
+        <p:spPr>
+          <a:xfrm>
+            <a:off x="606669" y="2280140"/>
+            <a:ext cx="10289688" cy="3909646"/>
           </a:xfrm>
         </p:spPr>
         <p:txBody>
           <a:bodyPr>
-            <a:normAutofit/>
+            <a:normAutofit lnSpcReduction="10000"/>
           </a:bodyPr>
           <a:lstStyle/>
           <a:p>
+            <a:pPr marL="0" indent="0">
+              <a:buNone/>
+            </a:pPr>
+            <a:r>
+              <a:rPr lang="en-US" sz="2800" b="1" dirty="0" smtClean="0"/>
+              <a:t>Expected Results</a:t>
+            </a:r>
+            <a:endParaRPr lang="en-US" sz="2800" b="1" dirty="0"/>
+          </a:p>
+          <a:p>
             <a:pPr lvl="1"/>
             <a:r>
-              <a:rPr lang="en-US" sz="2600" dirty="0" smtClean="0"/>
-              <a:t>API limits</a:t>
-            </a:r>
-            <a:endParaRPr lang="en-US" sz="2600" dirty="0"/>
+              <a:rPr lang="en-US" sz="2400" dirty="0" smtClean="0"/>
+              <a:t>We expected higher traffic collisions in the winter because of adverse weather conditions, but the opposite was proven</a:t>
+            </a:r>
+          </a:p>
+          <a:p>
+            <a:pPr marL="457200" lvl="1" indent="0">
+              <a:buNone/>
+            </a:pPr>
+            <a:endParaRPr lang="en-US" sz="2800" dirty="0"/>
+          </a:p>
+          <a:p>
+            <a:pPr marL="0" indent="0">
+              <a:buNone/>
+            </a:pPr>
+            <a:r>
+              <a:rPr lang="en-US" sz="2800" b="1" dirty="0" smtClean="0"/>
+              <a:t>Inferences</a:t>
+            </a:r>
           </a:p>
           <a:p>
             <a:pPr lvl="1"/>
             <a:r>
-              <a:rPr lang="en-US" sz="2600" dirty="0" err="1"/>
-              <a:t>Git</a:t>
-            </a:r>
-            <a:r>
-              <a:rPr lang="en-US" sz="2600" dirty="0"/>
-              <a:t> LFS</a:t>
-            </a:r>
+              <a:rPr lang="en-US" sz="2400" dirty="0" smtClean="0"/>
+              <a:t>The higher amounts of traffic collisions in the summer may be due to other factors such as: </a:t>
+            </a:r>
+          </a:p>
+          <a:p>
+            <a:pPr lvl="2"/>
+            <a:r>
+              <a:rPr lang="en-US" sz="2400" dirty="0" smtClean="0"/>
+              <a:t>Increase in total miles driven per person </a:t>
+            </a:r>
+          </a:p>
+          <a:p>
+            <a:pPr lvl="2"/>
+            <a:r>
+              <a:rPr lang="en-US" sz="2400" dirty="0" smtClean="0"/>
+              <a:t>Increased tourism  </a:t>
+            </a:r>
+          </a:p>
+          <a:p>
+            <a:pPr lvl="2"/>
+            <a:r>
+              <a:rPr lang="en-US" sz="2400" dirty="0" smtClean="0"/>
+              <a:t>Increase in night time activities </a:t>
+            </a:r>
+          </a:p>
+          <a:p>
+            <a:pPr lvl="2"/>
+            <a:endParaRPr lang="en-US" dirty="0" smtClean="0"/>
           </a:p>
           <a:p>
             <a:pPr lvl="1"/>
-            <a:r>
-              <a:rPr lang="en-US" sz="2600" dirty="0"/>
-              <a:t>Correcting weeks and years at year boundaries</a:t>
-            </a:r>
-          </a:p>
-          <a:p>
-            <a:endParaRPr lang="en-US" sz="2800" dirty="0"/>
+            <a:endParaRPr lang="en-US" dirty="0"/>
+          </a:p>
+          <a:p>
+            <a:endParaRPr lang="en-US" dirty="0"/>
           </a:p>
         </p:txBody>
       </p:sp>
     </p:spTree>
     <p:extLst>
       <p:ext uri="{BB962C8B-B14F-4D97-AF65-F5344CB8AC3E}">
-        <p14:creationId xmlns:p14="http://schemas.microsoft.com/office/powerpoint/2010/main" val="1254543814"/>
+        <p14:creationId xmlns:p14="http://schemas.microsoft.com/office/powerpoint/2010/main" val="173081127"/>
       </p:ext>
     </p:extLst>
   </p:cSld>
@@ -10000,7 +9912,7 @@
           <p:cNvPr id="2" name="Title 1">
             <a:extLst>
               <a:ext uri="{FF2B5EF4-FFF2-40B4-BE49-F238E27FC236}">
-                <a16:creationId xmlns:a16="http://schemas.microsoft.com/office/drawing/2014/main" xmlns="" id="{E92A2105-2D73-4E24-B721-D796B790C1AC}"/>
+                <a16:creationId xmlns="" xmlns:a16="http://schemas.microsoft.com/office/drawing/2014/main" id="{E92A2105-2D73-4E24-B721-D796B790C1AC}"/>
               </a:ext>
             </a:extLst>
           </p:cNvPr>
@@ -10018,11 +9930,7 @@
           <a:p>
             <a:r>
               <a:rPr lang="en-US" dirty="0" smtClean="0"/>
-              <a:t>Further Research/ </a:t>
-            </a:r>
-            <a:r>
-              <a:rPr lang="en-US" dirty="0" smtClean="0"/>
-              <a:t>questions</a:t>
+              <a:t>Further Research/ questions</a:t>
             </a:r>
             <a:endParaRPr lang="en-US" dirty="0"/>
           </a:p>
@@ -10033,7 +9941,7 @@
           <p:cNvPr id="3" name="Content Placeholder 2">
             <a:extLst>
               <a:ext uri="{FF2B5EF4-FFF2-40B4-BE49-F238E27FC236}">
-                <a16:creationId xmlns:a16="http://schemas.microsoft.com/office/drawing/2014/main" xmlns="" id="{C89E16CA-E7C2-43BA-B746-A817BEFC115B}"/>
+                <a16:creationId xmlns="" xmlns:a16="http://schemas.microsoft.com/office/drawing/2014/main" id="{C89E16CA-E7C2-43BA-B746-A817BEFC115B}"/>
               </a:ext>
             </a:extLst>
           </p:cNvPr>
@@ -10054,11 +9962,7 @@
             <a:pPr lvl="1"/>
             <a:r>
               <a:rPr lang="en-US" dirty="0" smtClean="0"/>
-              <a:t>Does the temperature affect the number of Pedestrians killed or injured</a:t>
-            </a:r>
-            <a:r>
-              <a:rPr lang="en-US" dirty="0" smtClean="0"/>
-              <a:t>?</a:t>
+              <a:t>Does the temperature affect the number of Pedestrians killed or injured?</a:t>
             </a:r>
           </a:p>
           <a:p>
@@ -10413,7 +10317,7 @@
           <p:cNvPr id="2" name="Title 1">
             <a:extLst>
               <a:ext uri="{FF2B5EF4-FFF2-40B4-BE49-F238E27FC236}">
-                <a16:creationId xmlns:a16="http://schemas.microsoft.com/office/drawing/2014/main" xmlns="" id="{3F944E5D-74C5-4D5B-82CF-2E7207B6111C}"/>
+                <a16:creationId xmlns="" xmlns:a16="http://schemas.microsoft.com/office/drawing/2014/main" id="{3F944E5D-74C5-4D5B-82CF-2E7207B6111C}"/>
               </a:ext>
             </a:extLst>
           </p:cNvPr>
@@ -10442,7 +10346,7 @@
           <p:cNvPr id="3" name="Content Placeholder 2">
             <a:extLst>
               <a:ext uri="{FF2B5EF4-FFF2-40B4-BE49-F238E27FC236}">
-                <a16:creationId xmlns:a16="http://schemas.microsoft.com/office/drawing/2014/main" xmlns="" id="{30A1A713-E431-4A6E-A04B-6CC1A7747713}"/>
+                <a16:creationId xmlns="" xmlns:a16="http://schemas.microsoft.com/office/drawing/2014/main" id="{30A1A713-E431-4A6E-A04B-6CC1A7747713}"/>
               </a:ext>
             </a:extLst>
           </p:cNvPr>
@@ -10565,7 +10469,7 @@
           <p:cNvPr id="3" name="Content Placeholder 2">
             <a:extLst>
               <a:ext uri="{FF2B5EF4-FFF2-40B4-BE49-F238E27FC236}">
-                <a16:creationId xmlns:a16="http://schemas.microsoft.com/office/drawing/2014/main" xmlns="" id="{0A940520-3412-47B6-BC6C-2BAE173C48C8}"/>
+                <a16:creationId xmlns="" xmlns:a16="http://schemas.microsoft.com/office/drawing/2014/main" id="{0A940520-3412-47B6-BC6C-2BAE173C48C8}"/>
               </a:ext>
             </a:extLst>
           </p:cNvPr>
@@ -10693,7 +10597,7 @@
           <p:cNvPr id="6" name="Picture 5">
             <a:extLst>
               <a:ext uri="{FF2B5EF4-FFF2-40B4-BE49-F238E27FC236}">
-                <a16:creationId xmlns:a16="http://schemas.microsoft.com/office/drawing/2014/main" xmlns="" id="{EB2B7A8F-A1B6-4241-B4C4-3D52920CA072}"/>
+                <a16:creationId xmlns="" xmlns:a16="http://schemas.microsoft.com/office/drawing/2014/main" id="{EB2B7A8F-A1B6-4241-B4C4-3D52920CA072}"/>
               </a:ext>
             </a:extLst>
           </p:cNvPr>
@@ -10723,7 +10627,7 @@
           <p:cNvPr id="10" name="Picture 9">
             <a:extLst>
               <a:ext uri="{FF2B5EF4-FFF2-40B4-BE49-F238E27FC236}">
-                <a16:creationId xmlns:a16="http://schemas.microsoft.com/office/drawing/2014/main" xmlns="" id="{7FD0779B-1A54-468D-8FAF-DFB24AE247B3}"/>
+                <a16:creationId xmlns="" xmlns:a16="http://schemas.microsoft.com/office/drawing/2014/main" id="{7FD0779B-1A54-468D-8FAF-DFB24AE247B3}"/>
               </a:ext>
             </a:extLst>
           </p:cNvPr>
@@ -10753,7 +10657,7 @@
           <p:cNvPr id="12" name="Title 1">
             <a:extLst>
               <a:ext uri="{FF2B5EF4-FFF2-40B4-BE49-F238E27FC236}">
-                <a16:creationId xmlns:a16="http://schemas.microsoft.com/office/drawing/2014/main" xmlns="" id="{20043D80-2817-4761-A2EB-32E5292EFD33}"/>
+                <a16:creationId xmlns="" xmlns:a16="http://schemas.microsoft.com/office/drawing/2014/main" id="{20043D80-2817-4761-A2EB-32E5292EFD33}"/>
               </a:ext>
             </a:extLst>
           </p:cNvPr>
@@ -10902,7 +10806,7 @@
           <p:cNvPr id="3" name="Content Placeholder 3">
             <a:extLst>
               <a:ext uri="{FF2B5EF4-FFF2-40B4-BE49-F238E27FC236}">
-                <a16:creationId xmlns:a16="http://schemas.microsoft.com/office/drawing/2014/main" xmlns="" id="{6778A102-F441-4415-9B3D-9617B0DFE199}"/>
+                <a16:creationId xmlns="" xmlns:a16="http://schemas.microsoft.com/office/drawing/2014/main" id="{6778A102-F441-4415-9B3D-9617B0DFE199}"/>
               </a:ext>
             </a:extLst>
           </p:cNvPr>
@@ -11239,7 +11143,7 @@
           <p:cNvPr id="5" name="Picture 4">
             <a:extLst>
               <a:ext uri="{FF2B5EF4-FFF2-40B4-BE49-F238E27FC236}">
-                <a16:creationId xmlns:a16="http://schemas.microsoft.com/office/drawing/2014/main" xmlns="" id="{5FE1963C-7056-4DED-BCEB-030643861179}"/>
+                <a16:creationId xmlns="" xmlns:a16="http://schemas.microsoft.com/office/drawing/2014/main" id="{5FE1963C-7056-4DED-BCEB-030643861179}"/>
               </a:ext>
             </a:extLst>
           </p:cNvPr>
@@ -11269,7 +11173,7 @@
           <p:cNvPr id="7" name="Picture 6">
             <a:extLst>
               <a:ext uri="{FF2B5EF4-FFF2-40B4-BE49-F238E27FC236}">
-                <a16:creationId xmlns:a16="http://schemas.microsoft.com/office/drawing/2014/main" xmlns="" id="{A0163D6A-DF97-4B35-9BD3-625F5951D28E}"/>
+                <a16:creationId xmlns="" xmlns:a16="http://schemas.microsoft.com/office/drawing/2014/main" id="{A0163D6A-DF97-4B35-9BD3-625F5951D28E}"/>
               </a:ext>
             </a:extLst>
           </p:cNvPr>
@@ -11363,13 +11267,7 @@
       </p:grpSpPr>
       <p:sp>
         <p:nvSpPr>
-          <p:cNvPr id="2" name="Title 1">
-            <a:extLst>
-              <a:ext uri="{FF2B5EF4-FFF2-40B4-BE49-F238E27FC236}">
-                <a16:creationId xmlns:a16="http://schemas.microsoft.com/office/drawing/2014/main" xmlns="" id="{AA2E8629-06EE-46BE-9102-963C75F88AB4}"/>
-              </a:ext>
-            </a:extLst>
-          </p:cNvPr>
+          <p:cNvPr id="2" name="Title 1"/>
           <p:cNvSpPr>
             <a:spLocks noGrp="1"/>
           </p:cNvSpPr>
@@ -11379,8 +11277,8 @@
         </p:nvSpPr>
         <p:spPr>
           <a:xfrm>
-            <a:off x="685801" y="458771"/>
-            <a:ext cx="10131425" cy="1456267"/>
+            <a:off x="3061854" y="570409"/>
+            <a:ext cx="8610600" cy="1293028"/>
           </a:xfrm>
         </p:spPr>
         <p:txBody>
@@ -11388,136 +11286,69 @@
           <a:lstStyle/>
           <a:p>
             <a:r>
-              <a:rPr lang="en-US" dirty="0"/>
-              <a:t>FINAL DATA FRAME</a:t>
-            </a:r>
-          </a:p>
-        </p:txBody>
-      </p:sp>
-      <p:pic>
-        <p:nvPicPr>
-          <p:cNvPr id="3" name="Content Placeholder 5">
-            <a:extLst>
-              <a:ext uri="{FF2B5EF4-FFF2-40B4-BE49-F238E27FC236}">
-                <a16:creationId xmlns:a16="http://schemas.microsoft.com/office/drawing/2014/main" xmlns="" id="{166E17B3-35B0-4092-84E7-2FBCB4D6E453}"/>
-              </a:ext>
-            </a:extLst>
-          </p:cNvPr>
-          <p:cNvPicPr>
-            <a:picLocks noChangeAspect="1"/>
-          </p:cNvPicPr>
-          <p:nvPr/>
-        </p:nvPicPr>
-        <p:blipFill>
-          <a:blip r:embed="rId2"/>
-          <a:stretch>
-            <a:fillRect/>
-          </a:stretch>
-        </p:blipFill>
-        <p:spPr>
-          <a:xfrm>
-            <a:off x="433633" y="3118341"/>
-            <a:ext cx="11384158" cy="2827274"/>
-          </a:xfrm>
-          <a:prstGeom prst="rect">
-            <a:avLst/>
-          </a:prstGeom>
-        </p:spPr>
-      </p:pic>
-      <p:sp>
-        <p:nvSpPr>
-          <p:cNvPr id="4" name="TextBox 3">
-            <a:extLst>
-              <a:ext uri="{FF2B5EF4-FFF2-40B4-BE49-F238E27FC236}">
-                <a16:creationId xmlns:a16="http://schemas.microsoft.com/office/drawing/2014/main" xmlns="" id="{9A42EB9A-35E4-4850-B607-C79DF8B9A310}"/>
-              </a:ext>
-            </a:extLst>
-          </p:cNvPr>
-          <p:cNvSpPr txBox="1"/>
-          <p:nvPr/>
-        </p:nvSpPr>
-        <p:spPr>
-          <a:xfrm>
-            <a:off x="685801" y="1715641"/>
-            <a:ext cx="8729221" cy="1477328"/>
-          </a:xfrm>
-          <a:prstGeom prst="rect">
-            <a:avLst/>
-          </a:prstGeom>
-          <a:noFill/>
-        </p:spPr>
-        <p:txBody>
-          <a:bodyPr wrap="square" rtlCol="0">
-            <a:spAutoFit/>
+              <a:rPr lang="en-US" dirty="0" smtClean="0"/>
+              <a:t>Challenges/difficulties</a:t>
+            </a:r>
+            <a:endParaRPr lang="en-US" dirty="0"/>
+          </a:p>
+        </p:txBody>
+      </p:sp>
+      <p:sp>
+        <p:nvSpPr>
+          <p:cNvPr id="3" name="Content Placeholder 2"/>
+          <p:cNvSpPr>
+            <a:spLocks noGrp="1"/>
+          </p:cNvSpPr>
+          <p:nvPr>
+            <p:ph sz="half" idx="1"/>
+          </p:nvPr>
+        </p:nvSpPr>
+        <p:spPr>
+          <a:xfrm>
+            <a:off x="838201" y="2587010"/>
+            <a:ext cx="10023763" cy="2774699"/>
+          </a:xfrm>
+        </p:spPr>
+        <p:txBody>
+          <a:bodyPr>
+            <a:normAutofit/>
           </a:bodyPr>
           <a:lstStyle/>
           <a:p>
-            <a:pPr marL="285750" indent="-285750">
-              <a:buFont typeface="Arial" panose="020B0604020202020204" pitchFamily="34" charset="0"/>
-              <a:buChar char="•"/>
-            </a:pPr>
-            <a:r>
-              <a:rPr lang="en-US" dirty="0"/>
-              <a:t>Merge NYC collisions data and Dark sky Weather </a:t>
-            </a:r>
-            <a:r>
-              <a:rPr lang="en-US" dirty="0" smtClean="0"/>
-              <a:t>data Left Join</a:t>
-            </a:r>
-            <a:endParaRPr lang="en-US" dirty="0"/>
-          </a:p>
-          <a:p>
-            <a:pPr marL="285750" indent="-285750">
-              <a:buFont typeface="Arial" panose="020B0604020202020204" pitchFamily="34" charset="0"/>
-              <a:buChar char="•"/>
-            </a:pPr>
-            <a:r>
-              <a:rPr lang="en-US" dirty="0" smtClean="0"/>
-              <a:t>Dropped most categorical information</a:t>
-            </a:r>
-          </a:p>
-          <a:p>
-            <a:pPr marL="285750" indent="-285750">
-              <a:buFont typeface="Arial" panose="020B0604020202020204" pitchFamily="34" charset="0"/>
-              <a:buChar char="•"/>
-            </a:pPr>
-            <a:r>
-              <a:rPr lang="en-US" dirty="0" smtClean="0"/>
-              <a:t>Create </a:t>
-            </a:r>
-            <a:r>
-              <a:rPr lang="en-US" dirty="0"/>
-              <a:t>“Year” and “Week” </a:t>
-            </a:r>
-            <a:r>
-              <a:rPr lang="en-US" dirty="0" smtClean="0"/>
-              <a:t>columns using an IF statement in a Loop</a:t>
-            </a:r>
-            <a:endParaRPr lang="en-US" dirty="0"/>
-          </a:p>
-          <a:p>
-            <a:pPr marL="285750" indent="-285750">
-              <a:buFont typeface="Arial" charset="0"/>
-              <a:buChar char="•"/>
-            </a:pPr>
-            <a:r>
-              <a:rPr lang="en-US" dirty="0"/>
-              <a:t>Create function to correct weeks and years at year boundaries</a:t>
-            </a:r>
-          </a:p>
-          <a:p>
-            <a:pPr marL="285750" indent="-285750">
-              <a:buFont typeface="Arial" panose="020B0604020202020204" pitchFamily="34" charset="0"/>
-              <a:buChar char="•"/>
-            </a:pPr>
-            <a:endParaRPr lang="en-US" dirty="0"/>
+            <a:pPr lvl="1"/>
+            <a:r>
+              <a:rPr lang="en-US" sz="2600" dirty="0" smtClean="0"/>
+              <a:t>API limits</a:t>
+            </a:r>
+            <a:endParaRPr lang="en-US" sz="2600" dirty="0"/>
+          </a:p>
+          <a:p>
+            <a:pPr lvl="1"/>
+            <a:r>
+              <a:rPr lang="en-US" sz="2600" dirty="0" err="1"/>
+              <a:t>Git</a:t>
+            </a:r>
+            <a:r>
+              <a:rPr lang="en-US" sz="2600" dirty="0"/>
+              <a:t> LFS</a:t>
+            </a:r>
+          </a:p>
+          <a:p>
+            <a:pPr lvl="1"/>
+            <a:r>
+              <a:rPr lang="en-US" sz="2600" dirty="0"/>
+              <a:t>Correcting weeks and years at year boundaries</a:t>
+            </a:r>
+          </a:p>
+          <a:p>
+            <a:endParaRPr lang="en-US" sz="2800" dirty="0"/>
           </a:p>
         </p:txBody>
       </p:sp>
     </p:spTree>
     <p:extLst>
       <p:ext uri="{BB962C8B-B14F-4D97-AF65-F5344CB8AC3E}">
-        <p14:creationId xmlns:p14="http://schemas.microsoft.com/office/powerpoint/2010/main" val="2760679971"/>
+        <p14:creationId xmlns:p14="http://schemas.microsoft.com/office/powerpoint/2010/main" val="934200125"/>
       </p:ext>
     </p:extLst>
   </p:cSld>
@@ -11551,21 +11382,52 @@
           <a:chExt cx="0" cy="0"/>
         </a:xfrm>
       </p:grpSpPr>
+      <p:sp>
+        <p:nvSpPr>
+          <p:cNvPr id="2" name="Title 1">
+            <a:extLst>
+              <a:ext uri="{FF2B5EF4-FFF2-40B4-BE49-F238E27FC236}">
+                <a16:creationId xmlns="" xmlns:a16="http://schemas.microsoft.com/office/drawing/2014/main" id="{AA2E8629-06EE-46BE-9102-963C75F88AB4}"/>
+              </a:ext>
+            </a:extLst>
+          </p:cNvPr>
+          <p:cNvSpPr>
+            <a:spLocks noGrp="1"/>
+          </p:cNvSpPr>
+          <p:nvPr>
+            <p:ph type="title"/>
+          </p:nvPr>
+        </p:nvSpPr>
+        <p:spPr>
+          <a:xfrm>
+            <a:off x="685801" y="458771"/>
+            <a:ext cx="10131425" cy="1456267"/>
+          </a:xfrm>
+        </p:spPr>
+        <p:txBody>
+          <a:bodyPr/>
+          <a:lstStyle/>
+          <a:p>
+            <a:r>
+              <a:rPr lang="en-US" dirty="0"/>
+              <a:t>FINAL DATA FRAME</a:t>
+            </a:r>
+          </a:p>
+        </p:txBody>
+      </p:sp>
       <p:pic>
         <p:nvPicPr>
-          <p:cNvPr id="5" name="Content Placeholder 4">
+          <p:cNvPr id="3" name="Content Placeholder 5">
             <a:extLst>
               <a:ext uri="{FF2B5EF4-FFF2-40B4-BE49-F238E27FC236}">
-                <a16:creationId xmlns:a16="http://schemas.microsoft.com/office/drawing/2014/main" xmlns="" id="{39D2510D-176A-45DE-8B7C-A525905EC0BB}"/>
+                <a16:creationId xmlns="" xmlns:a16="http://schemas.microsoft.com/office/drawing/2014/main" id="{166E17B3-35B0-4092-84E7-2FBCB4D6E453}"/>
               </a:ext>
             </a:extLst>
           </p:cNvPr>
           <p:cNvPicPr>
-            <a:picLocks noGrp="1" noChangeAspect="1"/>
+            <a:picLocks noChangeAspect="1"/>
           </p:cNvPicPr>
-          <p:nvPr>
-            <p:ph idx="1"/>
-          </p:nvPr>
+          <p:nvPr/>
         </p:nvPicPr>
         <p:blipFill>
           <a:blip r:embed="rId2"/>
@@ -11575,15 +11437,108 @@
         </p:blipFill>
         <p:spPr>
           <a:xfrm>
-            <a:off x="395722" y="484910"/>
-            <a:ext cx="11526979" cy="5763490"/>
-          </a:xfrm>
+            <a:off x="433633" y="3118341"/>
+            <a:ext cx="11384158" cy="2827274"/>
+          </a:xfrm>
+          <a:prstGeom prst="rect">
+            <a:avLst/>
+          </a:prstGeom>
         </p:spPr>
       </p:pic>
+      <p:sp>
+        <p:nvSpPr>
+          <p:cNvPr id="4" name="TextBox 3">
+            <a:extLst>
+              <a:ext uri="{FF2B5EF4-FFF2-40B4-BE49-F238E27FC236}">
+                <a16:creationId xmlns="" xmlns:a16="http://schemas.microsoft.com/office/drawing/2014/main" id="{9A42EB9A-35E4-4850-B607-C79DF8B9A310}"/>
+              </a:ext>
+            </a:extLst>
+          </p:cNvPr>
+          <p:cNvSpPr txBox="1"/>
+          <p:nvPr/>
+        </p:nvSpPr>
+        <p:spPr>
+          <a:xfrm>
+            <a:off x="685801" y="1715641"/>
+            <a:ext cx="8729221" cy="1477328"/>
+          </a:xfrm>
+          <a:prstGeom prst="rect">
+            <a:avLst/>
+          </a:prstGeom>
+          <a:noFill/>
+        </p:spPr>
+        <p:txBody>
+          <a:bodyPr wrap="square" rtlCol="0">
+            <a:spAutoFit/>
+          </a:bodyPr>
+          <a:lstStyle/>
+          <a:p>
+            <a:pPr marL="285750" indent="-285750">
+              <a:buFont typeface="Arial" panose="020B0604020202020204" pitchFamily="34" charset="0"/>
+              <a:buChar char="•"/>
+            </a:pPr>
+            <a:r>
+              <a:rPr lang="en-US" dirty="0"/>
+              <a:t>Merge NYC collisions data and Dark sky Weather </a:t>
+            </a:r>
+            <a:r>
+              <a:rPr lang="en-US" dirty="0" smtClean="0"/>
+              <a:t>data Left Join</a:t>
+            </a:r>
+            <a:endParaRPr lang="en-US" dirty="0"/>
+          </a:p>
+          <a:p>
+            <a:pPr marL="285750" indent="-285750">
+              <a:buFont typeface="Arial" panose="020B0604020202020204" pitchFamily="34" charset="0"/>
+              <a:buChar char="•"/>
+            </a:pPr>
+            <a:r>
+              <a:rPr lang="en-US" dirty="0" smtClean="0"/>
+              <a:t>Dropped most categorical information</a:t>
+            </a:r>
+          </a:p>
+          <a:p>
+            <a:pPr marL="285750" indent="-285750">
+              <a:buFont typeface="Arial" panose="020B0604020202020204" pitchFamily="34" charset="0"/>
+              <a:buChar char="•"/>
+            </a:pPr>
+            <a:r>
+              <a:rPr lang="en-US" dirty="0" smtClean="0"/>
+              <a:t>Create </a:t>
+            </a:r>
+            <a:r>
+              <a:rPr lang="en-US" dirty="0"/>
+              <a:t>“Year” and “Week” </a:t>
+            </a:r>
+            <a:r>
+              <a:rPr lang="en-US" dirty="0" smtClean="0"/>
+              <a:t>columns using an IF statement in a Loop</a:t>
+            </a:r>
+            <a:endParaRPr lang="en-US" dirty="0"/>
+          </a:p>
+          <a:p>
+            <a:pPr marL="285750" indent="-285750">
+              <a:buFont typeface="Arial" charset="0"/>
+              <a:buChar char="•"/>
+            </a:pPr>
+            <a:r>
+              <a:rPr lang="en-US" dirty="0"/>
+              <a:t>Create function to correct weeks and years at year boundaries</a:t>
+            </a:r>
+          </a:p>
+          <a:p>
+            <a:pPr marL="285750" indent="-285750">
+              <a:buFont typeface="Arial" panose="020B0604020202020204" pitchFamily="34" charset="0"/>
+              <a:buChar char="•"/>
+            </a:pPr>
+            <a:endParaRPr lang="en-US" dirty="0"/>
+          </a:p>
+        </p:txBody>
+      </p:sp>
     </p:spTree>
     <p:extLst>
       <p:ext uri="{BB962C8B-B14F-4D97-AF65-F5344CB8AC3E}">
-        <p14:creationId xmlns:p14="http://schemas.microsoft.com/office/powerpoint/2010/main" val="100125960"/>
+        <p14:creationId xmlns:p14="http://schemas.microsoft.com/office/powerpoint/2010/main" val="2760679971"/>
       </p:ext>
     </p:extLst>
   </p:cSld>

</xml_diff>